<commit_message>
update slides with contact info and direct link
</commit_message>
<xml_diff>
--- a/talk_slides/service_discovery_with_glider_labs_docker_austin_jan_8_2015.pptx
+++ b/talk_slides/service_discovery_with_glider_labs_docker_austin_jan_8_2015.pptx
@@ -20,6 +20,7 @@
     <p:sldId id="265" r:id="rId16"/>
     <p:sldId id="266" r:id="rId17"/>
     <p:sldId id="267" r:id="rId18"/>
+    <p:sldId id="268" r:id="rId19"/>
   </p:sldIdLst>
   <p:sldSz cy="5143500" cx="9144000"/>
   <p:notesSz cy="9144000" cx="6858000"/>
@@ -626,7 +627,7 @@
   <p:cSld>
     <p:spTree>
       <p:nvGrpSpPr>
-        <p:cNvPr id="117" name="Shape 117"/>
+        <p:cNvPr id="94" name="Shape 94"/>
         <p:cNvGrpSpPr/>
         <p:nvPr/>
       </p:nvGrpSpPr>
@@ -640,7 +641,7 @@
       </p:grpSpPr>
       <p:sp>
         <p:nvSpPr>
-          <p:cNvPr id="118" name="Shape 118"/>
+          <p:cNvPr id="95" name="Shape 95"/>
           <p:cNvSpPr/>
           <p:nvPr>
             <p:ph idx="2" type="sldImg"/>
@@ -684,7 +685,7 @@
       </p:sp>
       <p:sp>
         <p:nvSpPr>
-          <p:cNvPr id="119" name="Shape 119"/>
+          <p:cNvPr id="96" name="Shape 96"/>
           <p:cNvSpPr txBox="1"/>
           <p:nvPr>
             <p:ph idx="1" type="body"/>
@@ -831,6 +832,111 @@
 </p:notes>
 </file>
 
+<file path=ppt/notesSlides/notesSlide13.xml><?xml version="1.0" encoding="utf-8"?>
+<p:notes xmlns:a="http://schemas.openxmlformats.org/drawingml/2006/main" xmlns:r="http://schemas.openxmlformats.org/officeDocument/2006/relationships" xmlns:mc="http://schemas.openxmlformats.org/markup-compatibility/2006" xmlns:mv="urn:schemas-microsoft-com:mac:vml" xmlns:p="http://schemas.openxmlformats.org/presentationml/2006/main" xmlns:c="http://schemas.openxmlformats.org/drawingml/2006/chart" xmlns:dgm="http://schemas.openxmlformats.org/drawingml/2006/diagram" xmlns:o="urn:schemas-microsoft-com:office:office" xmlns:v="urn:schemas-microsoft-com:vml" xmlns:pvml="urn:schemas-microsoft-com:office:powerpoint" xmlns:com="http://schemas.openxmlformats.org/drawingml/2006/compatibility" xmlns:p14="http://schemas.microsoft.com/office/powerpoint/2010/main" showMasterSp="0" showMasterPhAnim="0">
+  <p:cSld>
+    <p:spTree>
+      <p:nvGrpSpPr>
+        <p:cNvPr id="129" name="Shape 129"/>
+        <p:cNvGrpSpPr/>
+        <p:nvPr/>
+      </p:nvGrpSpPr>
+      <p:grpSpPr>
+        <a:xfrm>
+          <a:off y="0" x="0"/>
+          <a:ext cy="0" cx="0"/>
+          <a:chOff y="0" x="0"/>
+          <a:chExt cy="0" cx="0"/>
+        </a:xfrm>
+      </p:grpSpPr>
+      <p:sp>
+        <p:nvSpPr>
+          <p:cNvPr id="130" name="Shape 130"/>
+          <p:cNvSpPr/>
+          <p:nvPr>
+            <p:ph idx="2" type="sldImg"/>
+          </p:nvPr>
+        </p:nvSpPr>
+        <p:spPr>
+          <a:xfrm>
+            <a:off y="685800" x="381187"/>
+            <a:ext cy="3429000" cx="6096299"/>
+          </a:xfrm>
+          <a:custGeom>
+            <a:pathLst>
+              <a:path w="120000" extrusionOk="0" h="120000">
+                <a:moveTo>
+                  <a:pt y="0" x="0"/>
+                </a:moveTo>
+                <a:lnTo>
+                  <a:pt y="0" x="120000"/>
+                </a:lnTo>
+                <a:lnTo>
+                  <a:pt y="120000" x="120000"/>
+                </a:lnTo>
+                <a:lnTo>
+                  <a:pt y="120000" x="0"/>
+                </a:lnTo>
+                <a:close/>
+              </a:path>
+            </a:pathLst>
+          </a:custGeom>
+          <a:noFill/>
+          <a:ln w="9525" cap="flat">
+            <a:solidFill>
+              <a:srgbClr val="000000"/>
+            </a:solidFill>
+            <a:prstDash val="solid"/>
+            <a:round/>
+            <a:headEnd w="med" len="med" type="none"/>
+            <a:tailEnd w="med" len="med" type="none"/>
+          </a:ln>
+        </p:spPr>
+      </p:sp>
+      <p:sp>
+        <p:nvSpPr>
+          <p:cNvPr id="131" name="Shape 131"/>
+          <p:cNvSpPr txBox="1"/>
+          <p:nvPr>
+            <p:ph idx="1" type="body"/>
+          </p:nvPr>
+        </p:nvSpPr>
+        <p:spPr>
+          <a:xfrm>
+            <a:off y="4343400" x="685800"/>
+            <a:ext cy="4114800" cx="5486399"/>
+          </a:xfrm>
+          <a:prstGeom prst="rect">
+            <a:avLst/>
+          </a:prstGeom>
+        </p:spPr>
+        <p:txBody>
+          <a:bodyPr bIns="91425" rIns="91425" lIns="91425" tIns="91425" anchor="t" anchorCtr="0">
+            <a:noAutofit/>
+          </a:bodyPr>
+          <a:lstStyle/>
+          <a:p>
+            <a:pPr>
+              <a:spcBef>
+                <a:spcPts val="0"/>
+              </a:spcBef>
+              <a:buNone/>
+            </a:pPr>
+            <a:r>
+              <a:t/>
+            </a:r>
+            <a:endParaRPr/>
+          </a:p>
+        </p:txBody>
+      </p:sp>
+    </p:spTree>
+  </p:cSld>
+  <p:clrMapOvr>
+    <a:masterClrMapping/>
+  </p:clrMapOvr>
+</p:notes>
+</file>
+
 <file path=ppt/notesSlides/notesSlide2.xml><?xml version="1.0" encoding="utf-8"?>
 <p:notes xmlns:a="http://schemas.openxmlformats.org/drawingml/2006/main" xmlns:r="http://schemas.openxmlformats.org/officeDocument/2006/relationships" xmlns:mc="http://schemas.openxmlformats.org/markup-compatibility/2006" xmlns:mv="urn:schemas-microsoft-com:mac:vml" xmlns:p="http://schemas.openxmlformats.org/presentationml/2006/main" xmlns:c="http://schemas.openxmlformats.org/drawingml/2006/chart" xmlns:dgm="http://schemas.openxmlformats.org/drawingml/2006/diagram" xmlns:o="urn:schemas-microsoft-com:office:office" xmlns:v="urn:schemas-microsoft-com:vml" xmlns:pvml="urn:schemas-microsoft-com:office:powerpoint" xmlns:com="http://schemas.openxmlformats.org/drawingml/2006/compatibility" xmlns:p14="http://schemas.microsoft.com/office/powerpoint/2010/main" showMasterSp="0" showMasterPhAnim="0">
   <p:cSld>
@@ -1132,9 +1238,9 @@
               <a:buNone/>
             </a:pPr>
             <a:r>
-              <a:rPr lang="en"/>
-              <a:t>So what is service discovery? Describe the directory, registration, deregistration, and lookup processes.</a:t>
-            </a:r>
+              <a:t/>
+            </a:r>
+            <a:endParaRPr/>
           </a:p>
         </p:txBody>
       </p:sp>
@@ -1238,7 +1344,7 @@
             </a:pPr>
             <a:r>
               <a:rPr lang="en"/>
-              <a:t>Talk about possible key / value stores to use.</a:t>
+              <a:t>So what is service discovery? Describe the directory, registration, deregistration, and lookup processes.</a:t>
             </a:r>
           </a:p>
         </p:txBody>
@@ -1343,7 +1449,7 @@
             </a:pPr>
             <a:r>
               <a:rPr lang="en"/>
-              <a:t>Beacon similar to registrator. docker-register</a:t>
+              <a:t>Talk about possible key / value stores to use.</a:t>
             </a:r>
           </a:p>
         </p:txBody>
@@ -1447,9 +1553,9 @@
               <a:buNone/>
             </a:pPr>
             <a:r>
-              <a:t/>
-            </a:r>
-            <a:endParaRPr/>
+              <a:rPr lang="en"/>
+              <a:t>Beacon similar to registrator. docker-register</a:t>
+            </a:r>
           </a:p>
         </p:txBody>
       </p:sp>
@@ -1552,9 +1658,9 @@
               <a:buNone/>
             </a:pPr>
             <a:r>
-              <a:rPr lang="en"/>
-              <a:t>Is the service providing the service? TTLs do not fully check that the service is providing. Talk about custom health checks with your own registration process / script (checking service health before adding).</a:t>
-            </a:r>
+              <a:t/>
+            </a:r>
+            <a:endParaRPr/>
           </a:p>
         </p:txBody>
       </p:sp>
@@ -1657,9 +1763,9 @@
               <a:buNone/>
             </a:pPr>
             <a:r>
-              <a:t/>
-            </a:r>
-            <a:endParaRPr/>
+              <a:rPr lang="en"/>
+              <a:t>Is the service providing the service? TTLs do not fully check that the service is providing. Talk about custom health checks with your own registration process / script (checking service health before adding).</a:t>
+            </a:r>
           </a:p>
         </p:txBody>
       </p:sp>
@@ -3923,7 +4029,7 @@
             </a:pPr>
             <a:r>
               <a:rPr lang="en"/>
-              <a:t>Demo time!</a:t>
+              <a:t>Other tools</a:t>
             </a:r>
           </a:p>
         </p:txBody>
@@ -3963,8 +4069,13 @@
               <a:buChar char="●"/>
             </a:pPr>
             <a:r>
-              <a:rPr lang="en"/>
-              <a:t>Registrator, Python app, Redis, nginx reverse proxy</a:t>
+              <a:rPr u="sng" lang="en">
+                <a:solidFill>
+                  <a:schemeClr val="hlink"/>
+                </a:solidFill>
+                <a:hlinkClick r:id="rId3"/>
+              </a:rPr>
+              <a:t>https://github.com/jwilder/docker-gen</a:t>
             </a:r>
           </a:p>
           <a:p>
@@ -3980,12 +4091,17 @@
               <a:buChar char="●"/>
             </a:pPr>
             <a:r>
-              <a:rPr lang="en"/>
-              <a:t>2 services, Redis and the Python app</a:t>
-            </a:r>
-          </a:p>
-          <a:p>
-            <a:pPr rtl="0" lvl="0" indent="-419100" marL="457200">
+              <a:rPr u="sng" lang="en">
+                <a:solidFill>
+                  <a:schemeClr val="hlink"/>
+                </a:solidFill>
+                <a:hlinkClick r:id="rId4"/>
+              </a:rPr>
+              <a:t>https://github.com/airbnb/synapse</a:t>
+            </a:r>
+          </a:p>
+          <a:p>
+            <a:pPr lvl="0" indent="-419100" marL="457200">
               <a:spcBef>
                 <a:spcPts val="0"/>
               </a:spcBef>
@@ -3997,42 +4113,13 @@
               <a:buChar char="●"/>
             </a:pPr>
             <a:r>
-              <a:rPr lang="en"/>
-              <a:t>Show Redis registration</a:t>
-            </a:r>
-          </a:p>
-          <a:p>
-            <a:pPr rtl="0" lvl="0" indent="-419100" marL="457200">
-              <a:spcBef>
-                <a:spcPts val="0"/>
-              </a:spcBef>
-              <a:buClr>
-                <a:schemeClr val="dk1"/>
-              </a:buClr>
-              <a:buSzPct val="100000"/>
-              <a:buFont typeface="Arial"/>
-              <a:buChar char="●"/>
-            </a:pPr>
-            <a:r>
-              <a:rPr lang="en"/>
-              <a:t>Show Python app using Redis via in-process discovery</a:t>
-            </a:r>
-          </a:p>
-          <a:p>
-            <a:pPr lvl="0" indent="-419100" marL="457200">
-              <a:spcBef>
-                <a:spcPts val="0"/>
-              </a:spcBef>
-              <a:buClr>
-                <a:schemeClr val="dk1"/>
-              </a:buClr>
-              <a:buSzPct val="100000"/>
-              <a:buFont typeface="Arial"/>
-              <a:buChar char="●"/>
-            </a:pPr>
-            <a:r>
-              <a:rPr lang="en"/>
-              <a:t>Show nginx proxying to Python app using co-process discovery</a:t>
+              <a:rPr u="sng" lang="en">
+                <a:solidFill>
+                  <a:schemeClr val="hlink"/>
+                </a:solidFill>
+                <a:hlinkClick r:id="rId5"/>
+              </a:rPr>
+              <a:t>https://github.com/skynetservices/skydns</a:t>
             </a:r>
           </a:p>
         </p:txBody>
@@ -4065,9 +4152,182 @@
           <a:chExt cy="0" cx="0"/>
         </a:xfrm>
       </p:grpSpPr>
+      <p:sp>
+        <p:nvSpPr>
+          <p:cNvPr id="92" name="Shape 92"/>
+          <p:cNvSpPr txBox="1"/>
+          <p:nvPr>
+            <p:ph type="title"/>
+          </p:nvPr>
+        </p:nvSpPr>
+        <p:spPr>
+          <a:xfrm>
+            <a:off y="205978" x="457200"/>
+            <a:ext cy="857400" cx="8229600"/>
+          </a:xfrm>
+          <a:prstGeom prst="rect">
+            <a:avLst/>
+          </a:prstGeom>
+        </p:spPr>
+        <p:txBody>
+          <a:bodyPr bIns="91425" rIns="91425" lIns="91425" tIns="91425" anchor="b" anchorCtr="0">
+            <a:noAutofit/>
+          </a:bodyPr>
+          <a:lstStyle/>
+          <a:p>
+            <a:pPr>
+              <a:spcBef>
+                <a:spcPts val="0"/>
+              </a:spcBef>
+              <a:buNone/>
+            </a:pPr>
+            <a:r>
+              <a:rPr lang="en"/>
+              <a:t>Demo time!</a:t>
+            </a:r>
+          </a:p>
+        </p:txBody>
+      </p:sp>
+      <p:sp>
+        <p:nvSpPr>
+          <p:cNvPr id="93" name="Shape 93"/>
+          <p:cNvSpPr txBox="1"/>
+          <p:nvPr>
+            <p:ph idx="1" type="body"/>
+          </p:nvPr>
+        </p:nvSpPr>
+        <p:spPr>
+          <a:xfrm>
+            <a:off y="1200150" x="457200"/>
+            <a:ext cy="3725699" cx="8229600"/>
+          </a:xfrm>
+          <a:prstGeom prst="rect">
+            <a:avLst/>
+          </a:prstGeom>
+        </p:spPr>
+        <p:txBody>
+          <a:bodyPr bIns="91425" rIns="91425" lIns="91425" tIns="91425" anchor="t" anchorCtr="0">
+            <a:noAutofit/>
+          </a:bodyPr>
+          <a:lstStyle/>
+          <a:p>
+            <a:pPr rtl="0" lvl="0" indent="-419100" marL="457200">
+              <a:spcBef>
+                <a:spcPts val="0"/>
+              </a:spcBef>
+              <a:buClr>
+                <a:schemeClr val="dk1"/>
+              </a:buClr>
+              <a:buSzPct val="100000"/>
+              <a:buFont typeface="Arial"/>
+              <a:buChar char="●"/>
+            </a:pPr>
+            <a:r>
+              <a:rPr lang="en"/>
+              <a:t>Registrator, Python app, Redis, nginx reverse proxy</a:t>
+            </a:r>
+          </a:p>
+          <a:p>
+            <a:pPr rtl="0" lvl="0" indent="-419100" marL="457200">
+              <a:spcBef>
+                <a:spcPts val="0"/>
+              </a:spcBef>
+              <a:buClr>
+                <a:schemeClr val="dk1"/>
+              </a:buClr>
+              <a:buSzPct val="100000"/>
+              <a:buFont typeface="Arial"/>
+              <a:buChar char="●"/>
+            </a:pPr>
+            <a:r>
+              <a:rPr lang="en"/>
+              <a:t>2 services, Redis and the Python app</a:t>
+            </a:r>
+          </a:p>
+          <a:p>
+            <a:pPr rtl="0" lvl="0" indent="-419100" marL="457200">
+              <a:spcBef>
+                <a:spcPts val="0"/>
+              </a:spcBef>
+              <a:buClr>
+                <a:schemeClr val="dk1"/>
+              </a:buClr>
+              <a:buSzPct val="100000"/>
+              <a:buFont typeface="Arial"/>
+              <a:buChar char="●"/>
+            </a:pPr>
+            <a:r>
+              <a:rPr lang="en"/>
+              <a:t>Show Redis registration</a:t>
+            </a:r>
+          </a:p>
+          <a:p>
+            <a:pPr rtl="0" lvl="0" indent="-419100" marL="457200">
+              <a:spcBef>
+                <a:spcPts val="0"/>
+              </a:spcBef>
+              <a:buClr>
+                <a:schemeClr val="dk1"/>
+              </a:buClr>
+              <a:buSzPct val="100000"/>
+              <a:buFont typeface="Arial"/>
+              <a:buChar char="●"/>
+            </a:pPr>
+            <a:r>
+              <a:rPr lang="en"/>
+              <a:t>Show Python app using Redis via in-process discovery</a:t>
+            </a:r>
+          </a:p>
+          <a:p>
+            <a:pPr lvl="0" indent="-419100" marL="457200">
+              <a:spcBef>
+                <a:spcPts val="0"/>
+              </a:spcBef>
+              <a:buClr>
+                <a:schemeClr val="dk1"/>
+              </a:buClr>
+              <a:buSzPct val="100000"/>
+              <a:buFont typeface="Arial"/>
+              <a:buChar char="●"/>
+            </a:pPr>
+            <a:r>
+              <a:rPr lang="en"/>
+              <a:t>Show nginx proxying to Python app using co-process discovery</a:t>
+            </a:r>
+          </a:p>
+        </p:txBody>
+      </p:sp>
+    </p:spTree>
+  </p:cSld>
+  <p:clrMapOvr>
+    <a:masterClrMapping/>
+  </p:clrMapOvr>
+  <p:transition spd="slow">
+    <p:cut/>
+  </p:transition>
+</p:sld>
+</file>
+
+<file path=ppt/slides/slide12.xml><?xml version="1.0" encoding="utf-8"?>
+<p:sld xmlns:a="http://schemas.openxmlformats.org/drawingml/2006/main" xmlns:r="http://schemas.openxmlformats.org/officeDocument/2006/relationships" xmlns:mc="http://schemas.openxmlformats.org/markup-compatibility/2006" xmlns:mv="urn:schemas-microsoft-com:mac:vml" xmlns:p="http://schemas.openxmlformats.org/presentationml/2006/main" xmlns:c="http://schemas.openxmlformats.org/drawingml/2006/chart" xmlns:dgm="http://schemas.openxmlformats.org/drawingml/2006/diagram" xmlns:o="urn:schemas-microsoft-com:office:office" xmlns:v="urn:schemas-microsoft-com:vml" xmlns:pvml="urn:schemas-microsoft-com:office:powerpoint" xmlns:com="http://schemas.openxmlformats.org/drawingml/2006/compatibility" xmlns:p14="http://schemas.microsoft.com/office/powerpoint/2010/main">
+  <p:cSld>
+    <p:spTree>
+      <p:nvGrpSpPr>
+        <p:cNvPr id="97" name="Shape 97"/>
+        <p:cNvGrpSpPr/>
+        <p:nvPr/>
+      </p:nvGrpSpPr>
+      <p:grpSpPr>
+        <a:xfrm>
+          <a:off y="0" x="0"/>
+          <a:ext cy="0" cx="0"/>
+          <a:chOff y="0" x="0"/>
+          <a:chExt cy="0" cx="0"/>
+        </a:xfrm>
+      </p:grpSpPr>
       <p:grpSp>
         <p:nvGrpSpPr>
-          <p:cNvPr id="92" name="Shape 92"/>
+          <p:cNvPr id="98" name="Shape 98"/>
           <p:cNvGrpSpPr/>
           <p:nvPr/>
         </p:nvGrpSpPr>
@@ -4081,7 +4341,7 @@
         </p:grpSpPr>
         <p:sp>
           <p:nvSpPr>
-            <p:cNvPr id="93" name="Shape 93"/>
+            <p:cNvPr id="99" name="Shape 99"/>
             <p:cNvSpPr/>
             <p:nvPr/>
           </p:nvSpPr>
@@ -4121,7 +4381,7 @@
         </p:sp>
         <p:sp>
           <p:nvSpPr>
-            <p:cNvPr id="94" name="Shape 94"/>
+            <p:cNvPr id="100" name="Shape 100"/>
             <p:cNvSpPr/>
             <p:nvPr/>
           </p:nvSpPr>
@@ -4162,7 +4422,7 @@
       </p:grpSp>
       <p:grpSp>
         <p:nvGrpSpPr>
-          <p:cNvPr id="95" name="Shape 95"/>
+          <p:cNvPr id="101" name="Shape 101"/>
           <p:cNvGrpSpPr/>
           <p:nvPr/>
         </p:nvGrpSpPr>
@@ -4176,7 +4436,7 @@
         </p:grpSpPr>
         <p:sp>
           <p:nvSpPr>
-            <p:cNvPr id="96" name="Shape 96"/>
+            <p:cNvPr id="102" name="Shape 102"/>
             <p:cNvSpPr/>
             <p:nvPr/>
           </p:nvSpPr>
@@ -4216,7 +4476,7 @@
         </p:sp>
         <p:sp>
           <p:nvSpPr>
-            <p:cNvPr id="97" name="Shape 97"/>
+            <p:cNvPr id="103" name="Shape 103"/>
             <p:cNvSpPr/>
             <p:nvPr/>
           </p:nvSpPr>
@@ -4257,7 +4517,7 @@
       </p:grpSp>
       <p:sp>
         <p:nvSpPr>
-          <p:cNvPr id="98" name="Shape 98"/>
+          <p:cNvPr id="104" name="Shape 104"/>
           <p:cNvSpPr/>
           <p:nvPr/>
         </p:nvSpPr>
@@ -4297,7 +4557,7 @@
       </p:sp>
       <p:sp>
         <p:nvSpPr>
-          <p:cNvPr id="99" name="Shape 99"/>
+          <p:cNvPr id="105" name="Shape 105"/>
           <p:cNvSpPr/>
           <p:nvPr/>
         </p:nvSpPr>
@@ -4337,7 +4597,7 @@
       </p:sp>
       <p:sp>
         <p:nvSpPr>
-          <p:cNvPr id="100" name="Shape 100"/>
+          <p:cNvPr id="106" name="Shape 106"/>
           <p:cNvSpPr/>
           <p:nvPr/>
         </p:nvSpPr>
@@ -4377,7 +4637,7 @@
       </p:sp>
       <p:sp>
         <p:nvSpPr>
-          <p:cNvPr id="101" name="Shape 101"/>
+          <p:cNvPr id="107" name="Shape 107"/>
           <p:cNvSpPr/>
           <p:nvPr/>
         </p:nvSpPr>
@@ -4417,7 +4677,7 @@
       </p:sp>
       <p:sp>
         <p:nvSpPr>
-          <p:cNvPr id="102" name="Shape 102"/>
+          <p:cNvPr id="108" name="Shape 108"/>
           <p:cNvSpPr/>
           <p:nvPr/>
         </p:nvSpPr>
@@ -4457,7 +4717,7 @@
       </p:sp>
       <p:grpSp>
         <p:nvGrpSpPr>
-          <p:cNvPr id="103" name="Shape 103"/>
+          <p:cNvPr id="109" name="Shape 109"/>
           <p:cNvGrpSpPr/>
           <p:nvPr/>
         </p:nvGrpSpPr>
@@ -4471,7 +4731,7 @@
         </p:grpSpPr>
         <p:sp>
           <p:nvSpPr>
-            <p:cNvPr id="104" name="Shape 104"/>
+            <p:cNvPr id="110" name="Shape 110"/>
             <p:cNvSpPr/>
             <p:nvPr/>
           </p:nvSpPr>
@@ -4511,7 +4771,7 @@
         </p:sp>
         <p:sp>
           <p:nvSpPr>
-            <p:cNvPr id="105" name="Shape 105"/>
+            <p:cNvPr id="111" name="Shape 111"/>
             <p:cNvSpPr/>
             <p:nvPr/>
           </p:nvSpPr>
@@ -4552,7 +4812,7 @@
       </p:grpSp>
       <p:sp>
         <p:nvSpPr>
-          <p:cNvPr id="106" name="Shape 106"/>
+          <p:cNvPr id="112" name="Shape 112"/>
           <p:cNvSpPr/>
           <p:nvPr/>
         </p:nvSpPr>
@@ -4592,7 +4852,7 @@
       </p:sp>
       <p:sp>
         <p:nvSpPr>
-          <p:cNvPr id="107" name="Shape 107"/>
+          <p:cNvPr id="113" name="Shape 113"/>
           <p:cNvSpPr/>
           <p:nvPr/>
         </p:nvSpPr>
@@ -4632,7 +4892,7 @@
       </p:sp>
       <p:sp>
         <p:nvSpPr>
-          <p:cNvPr id="108" name="Shape 108"/>
+          <p:cNvPr id="114" name="Shape 114"/>
           <p:cNvSpPr/>
           <p:nvPr/>
         </p:nvSpPr>
@@ -4672,7 +4932,7 @@
       </p:sp>
       <p:sp>
         <p:nvSpPr>
-          <p:cNvPr id="109" name="Shape 109"/>
+          <p:cNvPr id="115" name="Shape 115"/>
           <p:cNvSpPr/>
           <p:nvPr/>
         </p:nvSpPr>
@@ -4712,7 +4972,7 @@
       </p:sp>
       <p:sp>
         <p:nvSpPr>
-          <p:cNvPr id="110" name="Shape 110"/>
+          <p:cNvPr id="116" name="Shape 116"/>
           <p:cNvSpPr/>
           <p:nvPr/>
         </p:nvSpPr>
@@ -4752,7 +5012,7 @@
       </p:sp>
       <p:sp>
         <p:nvSpPr>
-          <p:cNvPr id="111" name="Shape 111"/>
+          <p:cNvPr id="117" name="Shape 117"/>
           <p:cNvSpPr/>
           <p:nvPr/>
         </p:nvSpPr>
@@ -4792,7 +5052,7 @@
       </p:sp>
       <p:sp>
         <p:nvSpPr>
-          <p:cNvPr id="112" name="Shape 112"/>
+          <p:cNvPr id="118" name="Shape 118"/>
           <p:cNvSpPr/>
           <p:nvPr/>
         </p:nvSpPr>
@@ -4832,7 +5092,7 @@
       </p:sp>
       <p:sp>
         <p:nvSpPr>
-          <p:cNvPr id="113" name="Shape 113"/>
+          <p:cNvPr id="119" name="Shape 119"/>
           <p:cNvSpPr/>
           <p:nvPr/>
         </p:nvSpPr>
@@ -4872,7 +5132,7 @@
       </p:sp>
       <p:sp>
         <p:nvSpPr>
-          <p:cNvPr id="114" name="Shape 114"/>
+          <p:cNvPr id="120" name="Shape 120"/>
           <p:cNvSpPr/>
           <p:nvPr/>
         </p:nvSpPr>
@@ -4912,7 +5172,7 @@
       </p:sp>
       <p:sp>
         <p:nvSpPr>
-          <p:cNvPr id="115" name="Shape 115"/>
+          <p:cNvPr id="121" name="Shape 121"/>
           <p:cNvSpPr/>
           <p:nvPr/>
         </p:nvSpPr>
@@ -4952,7 +5212,7 @@
       </p:sp>
       <p:sp>
         <p:nvSpPr>
-          <p:cNvPr id="116" name="Shape 116"/>
+          <p:cNvPr id="122" name="Shape 122"/>
           <p:cNvSpPr/>
           <p:nvPr/>
         </p:nvSpPr>
@@ -5032,7 +5292,7 @@
                                           </p:stCondLst>
                                         </p:cTn>
                                         <p:tgtEl>
-                                          <p:spTgt spid="113"/>
+                                          <p:spTgt spid="119"/>
                                         </p:tgtEl>
                                         <p:attrNameLst>
                                           <p:attrName>style.visibility</p:attrName>
@@ -5046,7 +5306,7 @@
                                       <p:cBhvr>
                                         <p:cTn dur="500"/>
                                         <p:tgtEl>
-                                          <p:spTgt spid="113"/>
+                                          <p:spTgt spid="119"/>
                                         </p:tgtEl>
                                       </p:cBhvr>
                                     </p:animEffect>
@@ -5067,7 +5327,7 @@
                                           </p:stCondLst>
                                         </p:cTn>
                                         <p:tgtEl>
-                                          <p:spTgt spid="114"/>
+                                          <p:spTgt spid="120"/>
                                         </p:tgtEl>
                                         <p:attrNameLst>
                                           <p:attrName>style.visibility</p:attrName>
@@ -5081,7 +5341,7 @@
                                       <p:cBhvr>
                                         <p:cTn dur="500"/>
                                         <p:tgtEl>
-                                          <p:spTgt spid="114"/>
+                                          <p:spTgt spid="120"/>
                                         </p:tgtEl>
                                       </p:cBhvr>
                                     </p:animEffect>
@@ -5102,7 +5362,7 @@
                                           </p:stCondLst>
                                         </p:cTn>
                                         <p:tgtEl>
-                                          <p:spTgt spid="115"/>
+                                          <p:spTgt spid="121"/>
                                         </p:tgtEl>
                                         <p:attrNameLst>
                                           <p:attrName>style.visibility</p:attrName>
@@ -5116,7 +5376,7 @@
                                       <p:cBhvr>
                                         <p:cTn dur="500"/>
                                         <p:tgtEl>
-                                          <p:spTgt spid="115"/>
+                                          <p:spTgt spid="121"/>
                                         </p:tgtEl>
                                       </p:cBhvr>
                                     </p:animEffect>
@@ -5155,7 +5415,7 @@
                                           </p:stCondLst>
                                         </p:cTn>
                                         <p:tgtEl>
-                                          <p:spTgt spid="98"/>
+                                          <p:spTgt spid="104"/>
                                         </p:tgtEl>
                                         <p:attrNameLst>
                                           <p:attrName>style.visibility</p:attrName>
@@ -5169,7 +5429,201 @@
                                       <p:cBhvr>
                                         <p:cTn dur="500"/>
                                         <p:tgtEl>
-                                          <p:spTgt spid="98"/>
+                                          <p:spTgt spid="104"/>
+                                        </p:tgtEl>
+                                      </p:cBhvr>
+                                    </p:animEffect>
+                                  </p:childTnLst>
+                                </p:cTn>
+                              </p:par>
+                            </p:childTnLst>
+                          </p:cTn>
+                        </p:par>
+                      </p:childTnLst>
+                    </p:cTn>
+                  </p:par>
+                  <p:par>
+                    <p:cTn fill="hold">
+                      <p:stCondLst>
+                        <p:cond delay="indefinite"/>
+                      </p:stCondLst>
+                      <p:childTnLst>
+                        <p:par>
+                          <p:cTn fill="hold">
+                            <p:stCondLst>
+                              <p:cond delay="0"/>
+                            </p:stCondLst>
+                            <p:childTnLst>
+                              <p:par>
+                                <p:cTn presetID="10" fill="hold" presetSubtype="0" presetClass="entr" nodeType="clickEffect">
+                                  <p:stCondLst>
+                                    <p:cond delay="0"/>
+                                  </p:stCondLst>
+                                  <p:childTnLst>
+                                    <p:set>
+                                      <p:cBhvr>
+                                        <p:cTn dur="1" fill="hold">
+                                          <p:stCondLst>
+                                            <p:cond delay="0"/>
+                                          </p:stCondLst>
+                                        </p:cTn>
+                                        <p:tgtEl>
+                                          <p:spTgt spid="112"/>
+                                        </p:tgtEl>
+                                        <p:attrNameLst>
+                                          <p:attrName>style.visibility</p:attrName>
+                                        </p:attrNameLst>
+                                      </p:cBhvr>
+                                      <p:to>
+                                        <p:strVal val="visible"/>
+                                      </p:to>
+                                    </p:set>
+                                    <p:animEffect transition="in" filter="fade">
+                                      <p:cBhvr>
+                                        <p:cTn dur="500"/>
+                                        <p:tgtEl>
+                                          <p:spTgt spid="112"/>
+                                        </p:tgtEl>
+                                      </p:cBhvr>
+                                    </p:animEffect>
+                                  </p:childTnLst>
+                                </p:cTn>
+                              </p:par>
+                            </p:childTnLst>
+                          </p:cTn>
+                        </p:par>
+                      </p:childTnLst>
+                    </p:cTn>
+                  </p:par>
+                  <p:par>
+                    <p:cTn fill="hold">
+                      <p:stCondLst>
+                        <p:cond delay="indefinite"/>
+                      </p:stCondLst>
+                      <p:childTnLst>
+                        <p:par>
+                          <p:cTn fill="hold">
+                            <p:stCondLst>
+                              <p:cond delay="0"/>
+                            </p:stCondLst>
+                            <p:childTnLst>
+                              <p:par>
+                                <p:cTn presetID="10" fill="hold" presetSubtype="0" presetClass="entr" nodeType="clickEffect">
+                                  <p:stCondLst>
+                                    <p:cond delay="0"/>
+                                  </p:stCondLst>
+                                  <p:childTnLst>
+                                    <p:set>
+                                      <p:cBhvr>
+                                        <p:cTn dur="1" fill="hold">
+                                          <p:stCondLst>
+                                            <p:cond delay="0"/>
+                                          </p:stCondLst>
+                                        </p:cTn>
+                                        <p:tgtEl>
+                                          <p:spTgt spid="107"/>
+                                        </p:tgtEl>
+                                        <p:attrNameLst>
+                                          <p:attrName>style.visibility</p:attrName>
+                                        </p:attrNameLst>
+                                      </p:cBhvr>
+                                      <p:to>
+                                        <p:strVal val="visible"/>
+                                      </p:to>
+                                    </p:set>
+                                    <p:animEffect transition="in" filter="fade">
+                                      <p:cBhvr>
+                                        <p:cTn dur="500"/>
+                                        <p:tgtEl>
+                                          <p:spTgt spid="107"/>
+                                        </p:tgtEl>
+                                      </p:cBhvr>
+                                    </p:animEffect>
+                                  </p:childTnLst>
+                                </p:cTn>
+                              </p:par>
+                            </p:childTnLst>
+                          </p:cTn>
+                        </p:par>
+                      </p:childTnLst>
+                    </p:cTn>
+                  </p:par>
+                  <p:par>
+                    <p:cTn fill="hold">
+                      <p:stCondLst>
+                        <p:cond delay="indefinite"/>
+                      </p:stCondLst>
+                      <p:childTnLst>
+                        <p:par>
+                          <p:cTn fill="hold">
+                            <p:stCondLst>
+                              <p:cond delay="0"/>
+                            </p:stCondLst>
+                            <p:childTnLst>
+                              <p:par>
+                                <p:cTn presetID="10" fill="hold" presetSubtype="0" presetClass="entr" nodeType="clickEffect">
+                                  <p:stCondLst>
+                                    <p:cond delay="0"/>
+                                  </p:stCondLst>
+                                  <p:childTnLst>
+                                    <p:set>
+                                      <p:cBhvr>
+                                        <p:cTn dur="1" fill="hold">
+                                          <p:stCondLst>
+                                            <p:cond delay="0"/>
+                                          </p:stCondLst>
+                                        </p:cTn>
+                                        <p:tgtEl>
+                                          <p:spTgt spid="108"/>
+                                        </p:tgtEl>
+                                        <p:attrNameLst>
+                                          <p:attrName>style.visibility</p:attrName>
+                                        </p:attrNameLst>
+                                      </p:cBhvr>
+                                      <p:to>
+                                        <p:strVal val="visible"/>
+                                      </p:to>
+                                    </p:set>
+                                    <p:animEffect transition="in" filter="fade">
+                                      <p:cBhvr>
+                                        <p:cTn dur="500"/>
+                                        <p:tgtEl>
+                                          <p:spTgt spid="108"/>
+                                        </p:tgtEl>
+                                      </p:cBhvr>
+                                    </p:animEffect>
+                                  </p:childTnLst>
+                                </p:cTn>
+                              </p:par>
+                              <p:par>
+                                <p:cTn presetID="10" fill="hold" presetSubtype="0" presetClass="entr" nodeType="withEffect">
+                                  <p:stCondLst>
+                                    <p:cond delay="0"/>
+                                  </p:stCondLst>
+                                  <p:childTnLst>
+                                    <p:set>
+                                      <p:cBhvr>
+                                        <p:cTn dur="1" fill="hold">
+                                          <p:stCondLst>
+                                            <p:cond delay="0"/>
+                                          </p:stCondLst>
+                                        </p:cTn>
+                                        <p:tgtEl>
+                                          <p:spTgt spid="105"/>
+                                        </p:tgtEl>
+                                        <p:attrNameLst>
+                                          <p:attrName>style.visibility</p:attrName>
+                                        </p:attrNameLst>
+                                      </p:cBhvr>
+                                      <p:to>
+                                        <p:strVal val="visible"/>
+                                      </p:to>
+                                    </p:set>
+                                    <p:animEffect transition="in" filter="fade">
+                                      <p:cBhvr>
+                                        <p:cTn dur="500"/>
+                                        <p:tgtEl>
+                                          <p:spTgt spid="105"/>
                                         </p:tgtEl>
                                       </p:cBhvr>
                                     </p:animEffect>
@@ -5248,7 +5702,80 @@
                             </p:stCondLst>
                             <p:childTnLst>
                               <p:par>
-                                <p:cTn presetID="10" fill="hold" presetSubtype="0" presetClass="entr" nodeType="clickEffect">
+                                <p:cTn presetID="8" fill="hold" presetSubtype="0" presetClass="emph" nodeType="clickEffect">
+                                  <p:stCondLst>
+                                    <p:cond delay="0"/>
+                                  </p:stCondLst>
+                                  <p:childTnLst>
+                                    <p:animRot by="-21600000">
+                                      <p:cBhvr>
+                                        <p:cTn dur="400" fill="hold"/>
+                                        <p:tgtEl>
+                                          <p:spTgt spid="104"/>
+                                        </p:tgtEl>
+                                        <p:attrNameLst>
+                                          <p:attrName>r</p:attrName>
+                                        </p:attrNameLst>
+                                      </p:cBhvr>
+                                    </p:animRot>
+                                  </p:childTnLst>
+                                </p:cTn>
+                              </p:par>
+                            </p:childTnLst>
+                          </p:cTn>
+                        </p:par>
+                        <p:par>
+                          <p:cTn fill="hold">
+                            <p:stCondLst>
+                              <p:cond delay="400"/>
+                            </p:stCondLst>
+                            <p:childTnLst>
+                              <p:par>
+                                <p:cTn presetID="10" fill="hold" presetSubtype="0" presetClass="exit" nodeType="afterEffect">
+                                  <p:stCondLst>
+                                    <p:cond delay="0"/>
+                                  </p:stCondLst>
+                                  <p:childTnLst>
+                                    <p:animEffect transition="out" filter="fade">
+                                      <p:cBhvr>
+                                        <p:cTn dur="500"/>
+                                        <p:tgtEl>
+                                          <p:spTgt spid="104"/>
+                                        </p:tgtEl>
+                                      </p:cBhvr>
+                                    </p:animEffect>
+                                    <p:set>
+                                      <p:cBhvr>
+                                        <p:cTn dur="1" fill="hold">
+                                          <p:stCondLst>
+                                            <p:cond delay="500"/>
+                                          </p:stCondLst>
+                                        </p:cTn>
+                                        <p:tgtEl>
+                                          <p:spTgt spid="104"/>
+                                        </p:tgtEl>
+                                        <p:attrNameLst>
+                                          <p:attrName>style.visibility</p:attrName>
+                                        </p:attrNameLst>
+                                      </p:cBhvr>
+                                      <p:to>
+                                        <p:strVal val="hidden"/>
+                                      </p:to>
+                                    </p:set>
+                                  </p:childTnLst>
+                                </p:cTn>
+                              </p:par>
+                            </p:childTnLst>
+                          </p:cTn>
+                        </p:par>
+                        <p:par>
+                          <p:cTn fill="hold">
+                            <p:stCondLst>
+                              <p:cond delay="900"/>
+                            </p:stCondLst>
+                            <p:childTnLst>
+                              <p:par>
+                                <p:cTn presetID="10" fill="hold" presetSubtype="0" presetClass="entr" nodeType="afterEffect">
                                   <p:stCondLst>
                                     <p:cond delay="0"/>
                                   </p:stCondLst>
@@ -5261,7 +5788,7 @@
                                           </p:stCondLst>
                                         </p:cTn>
                                         <p:tgtEl>
-                                          <p:spTgt spid="101"/>
+                                          <p:spTgt spid="122"/>
                                         </p:tgtEl>
                                         <p:attrNameLst>
                                           <p:attrName>style.visibility</p:attrName>
@@ -5275,148 +5802,7 @@
                                       <p:cBhvr>
                                         <p:cTn dur="500"/>
                                         <p:tgtEl>
-                                          <p:spTgt spid="101"/>
-                                        </p:tgtEl>
-                                      </p:cBhvr>
-                                    </p:animEffect>
-                                  </p:childTnLst>
-                                </p:cTn>
-                              </p:par>
-                            </p:childTnLst>
-                          </p:cTn>
-                        </p:par>
-                      </p:childTnLst>
-                    </p:cTn>
-                  </p:par>
-                  <p:par>
-                    <p:cTn fill="hold">
-                      <p:stCondLst>
-                        <p:cond delay="indefinite"/>
-                      </p:stCondLst>
-                      <p:childTnLst>
-                        <p:par>
-                          <p:cTn fill="hold">
-                            <p:stCondLst>
-                              <p:cond delay="0"/>
-                            </p:stCondLst>
-                            <p:childTnLst>
-                              <p:par>
-                                <p:cTn presetID="10" fill="hold" presetSubtype="0" presetClass="entr" nodeType="clickEffect">
-                                  <p:stCondLst>
-                                    <p:cond delay="0"/>
-                                  </p:stCondLst>
-                                  <p:childTnLst>
-                                    <p:set>
-                                      <p:cBhvr>
-                                        <p:cTn dur="1" fill="hold">
-                                          <p:stCondLst>
-                                            <p:cond delay="0"/>
-                                          </p:stCondLst>
-                                        </p:cTn>
-                                        <p:tgtEl>
-                                          <p:spTgt spid="102"/>
-                                        </p:tgtEl>
-                                        <p:attrNameLst>
-                                          <p:attrName>style.visibility</p:attrName>
-                                        </p:attrNameLst>
-                                      </p:cBhvr>
-                                      <p:to>
-                                        <p:strVal val="visible"/>
-                                      </p:to>
-                                    </p:set>
-                                    <p:animEffect transition="in" filter="fade">
-                                      <p:cBhvr>
-                                        <p:cTn dur="500"/>
-                                        <p:tgtEl>
-                                          <p:spTgt spid="102"/>
-                                        </p:tgtEl>
-                                      </p:cBhvr>
-                                    </p:animEffect>
-                                  </p:childTnLst>
-                                </p:cTn>
-                              </p:par>
-                              <p:par>
-                                <p:cTn presetID="10" fill="hold" presetSubtype="0" presetClass="entr" nodeType="withEffect">
-                                  <p:stCondLst>
-                                    <p:cond delay="0"/>
-                                  </p:stCondLst>
-                                  <p:childTnLst>
-                                    <p:set>
-                                      <p:cBhvr>
-                                        <p:cTn dur="1" fill="hold">
-                                          <p:stCondLst>
-                                            <p:cond delay="0"/>
-                                          </p:stCondLst>
-                                        </p:cTn>
-                                        <p:tgtEl>
-                                          <p:spTgt spid="99"/>
-                                        </p:tgtEl>
-                                        <p:attrNameLst>
-                                          <p:attrName>style.visibility</p:attrName>
-                                        </p:attrNameLst>
-                                      </p:cBhvr>
-                                      <p:to>
-                                        <p:strVal val="visible"/>
-                                      </p:to>
-                                    </p:set>
-                                    <p:animEffect transition="in" filter="fade">
-                                      <p:cBhvr>
-                                        <p:cTn dur="500"/>
-                                        <p:tgtEl>
-                                          <p:spTgt spid="99"/>
-                                        </p:tgtEl>
-                                      </p:cBhvr>
-                                    </p:animEffect>
-                                  </p:childTnLst>
-                                </p:cTn>
-                              </p:par>
-                            </p:childTnLst>
-                          </p:cTn>
-                        </p:par>
-                      </p:childTnLst>
-                    </p:cTn>
-                  </p:par>
-                  <p:par>
-                    <p:cTn fill="hold">
-                      <p:stCondLst>
-                        <p:cond delay="indefinite"/>
-                      </p:stCondLst>
-                      <p:childTnLst>
-                        <p:par>
-                          <p:cTn fill="hold">
-                            <p:stCondLst>
-                              <p:cond delay="0"/>
-                            </p:stCondLst>
-                            <p:childTnLst>
-                              <p:par>
-                                <p:cTn presetID="10" fill="hold" presetSubtype="0" presetClass="entr" nodeType="clickEffect">
-                                  <p:stCondLst>
-                                    <p:cond delay="0"/>
-                                  </p:stCondLst>
-                                  <p:childTnLst>
-                                    <p:set>
-                                      <p:cBhvr>
-                                        <p:cTn dur="1" fill="hold">
-                                          <p:stCondLst>
-                                            <p:cond delay="0"/>
-                                          </p:stCondLst>
-                                        </p:cTn>
-                                        <p:tgtEl>
-                                          <p:spTgt spid="100"/>
-                                        </p:tgtEl>
-                                        <p:attrNameLst>
-                                          <p:attrName>style.visibility</p:attrName>
-                                        </p:attrNameLst>
-                                      </p:cBhvr>
-                                      <p:to>
-                                        <p:strVal val="visible"/>
-                                      </p:to>
-                                    </p:set>
-                                    <p:animEffect transition="in" filter="fade">
-                                      <p:cBhvr>
-                                        <p:cTn dur="500"/>
-                                        <p:tgtEl>
-                                          <p:spTgt spid="100"/>
+                                          <p:spTgt spid="122"/>
                                         </p:tgtEl>
                                       </p:cBhvr>
                                     </p:animEffect>
@@ -5505,99 +5891,8 @@
                                   </p:childTnLst>
                                 </p:cTn>
                               </p:par>
-                            </p:childTnLst>
-                          </p:cTn>
-                        </p:par>
-                        <p:par>
-                          <p:cTn fill="hold">
-                            <p:stCondLst>
-                              <p:cond delay="900"/>
-                            </p:stCondLst>
-                            <p:childTnLst>
                               <p:par>
-                                <p:cTn presetID="10" fill="hold" presetSubtype="0" presetClass="entr" nodeType="afterEffect">
-                                  <p:stCondLst>
-                                    <p:cond delay="0"/>
-                                  </p:stCondLst>
-                                  <p:childTnLst>
-                                    <p:set>
-                                      <p:cBhvr>
-                                        <p:cTn dur="1" fill="hold">
-                                          <p:stCondLst>
-                                            <p:cond delay="0"/>
-                                          </p:stCondLst>
-                                        </p:cTn>
-                                        <p:tgtEl>
-                                          <p:spTgt spid="116"/>
-                                        </p:tgtEl>
-                                        <p:attrNameLst>
-                                          <p:attrName>style.visibility</p:attrName>
-                                        </p:attrNameLst>
-                                      </p:cBhvr>
-                                      <p:to>
-                                        <p:strVal val="visible"/>
-                                      </p:to>
-                                    </p:set>
-                                    <p:animEffect transition="in" filter="fade">
-                                      <p:cBhvr>
-                                        <p:cTn dur="500"/>
-                                        <p:tgtEl>
-                                          <p:spTgt spid="116"/>
-                                        </p:tgtEl>
-                                      </p:cBhvr>
-                                    </p:animEffect>
-                                  </p:childTnLst>
-                                </p:cTn>
-                              </p:par>
-                            </p:childTnLst>
-                          </p:cTn>
-                        </p:par>
-                      </p:childTnLst>
-                    </p:cTn>
-                  </p:par>
-                  <p:par>
-                    <p:cTn fill="hold">
-                      <p:stCondLst>
-                        <p:cond delay="indefinite"/>
-                      </p:stCondLst>
-                      <p:childTnLst>
-                        <p:par>
-                          <p:cTn fill="hold">
-                            <p:stCondLst>
-                              <p:cond delay="0"/>
-                            </p:stCondLst>
-                            <p:childTnLst>
-                              <p:par>
-                                <p:cTn presetID="8" fill="hold" presetSubtype="0" presetClass="emph" nodeType="clickEffect">
-                                  <p:stCondLst>
-                                    <p:cond delay="0"/>
-                                  </p:stCondLst>
-                                  <p:childTnLst>
-                                    <p:animRot by="-21600000">
-                                      <p:cBhvr>
-                                        <p:cTn dur="400" fill="hold"/>
-                                        <p:tgtEl>
-                                          <p:spTgt spid="92"/>
-                                        </p:tgtEl>
-                                        <p:attrNameLst>
-                                          <p:attrName>r</p:attrName>
-                                        </p:attrNameLst>
-                                      </p:cBhvr>
-                                    </p:animRot>
-                                  </p:childTnLst>
-                                </p:cTn>
-                              </p:par>
-                            </p:childTnLst>
-                          </p:cTn>
-                        </p:par>
-                        <p:par>
-                          <p:cTn fill="hold">
-                            <p:stCondLst>
-                              <p:cond delay="400"/>
-                            </p:stCondLst>
-                            <p:childTnLst>
-                              <p:par>
-                                <p:cTn presetID="10" fill="hold" presetSubtype="0" presetClass="exit" nodeType="afterEffect">
+                                <p:cTn presetID="10" fill="hold" presetSubtype="0" presetClass="exit" nodeType="withEffect">
                                   <p:stCondLst>
                                     <p:cond delay="0"/>
                                   </p:stCondLst>
@@ -5606,7 +5901,7 @@
                                       <p:cBhvr>
                                         <p:cTn dur="500"/>
                                         <p:tgtEl>
-                                          <p:spTgt spid="92"/>
+                                          <p:spTgt spid="107"/>
                                         </p:tgtEl>
                                       </p:cBhvr>
                                     </p:animEffect>
@@ -5618,7 +5913,7 @@
                                           </p:stCondLst>
                                         </p:cTn>
                                         <p:tgtEl>
-                                          <p:spTgt spid="92"/>
+                                          <p:spTgt spid="107"/>
                                         </p:tgtEl>
                                         <p:attrNameLst>
                                           <p:attrName>style.visibility</p:attrName>
@@ -5641,7 +5936,7 @@
                                       <p:cBhvr>
                                         <p:cTn dur="500"/>
                                         <p:tgtEl>
-                                          <p:spTgt spid="101"/>
+                                          <p:spTgt spid="108"/>
                                         </p:tgtEl>
                                       </p:cBhvr>
                                     </p:animEffect>
@@ -5653,7 +5948,7 @@
                                           </p:stCondLst>
                                         </p:cTn>
                                         <p:tgtEl>
-                                          <p:spTgt spid="101"/>
+                                          <p:spTgt spid="108"/>
                                         </p:tgtEl>
                                         <p:attrNameLst>
                                           <p:attrName>style.visibility</p:attrName>
@@ -5676,7 +5971,7 @@
                                       <p:cBhvr>
                                         <p:cTn dur="500"/>
                                         <p:tgtEl>
-                                          <p:spTgt spid="102"/>
+                                          <p:spTgt spid="121"/>
                                         </p:tgtEl>
                                       </p:cBhvr>
                                     </p:animEffect>
@@ -5688,42 +5983,7 @@
                                           </p:stCondLst>
                                         </p:cTn>
                                         <p:tgtEl>
-                                          <p:spTgt spid="102"/>
-                                        </p:tgtEl>
-                                        <p:attrNameLst>
-                                          <p:attrName>style.visibility</p:attrName>
-                                        </p:attrNameLst>
-                                      </p:cBhvr>
-                                      <p:to>
-                                        <p:strVal val="hidden"/>
-                                      </p:to>
-                                    </p:set>
-                                  </p:childTnLst>
-                                </p:cTn>
-                              </p:par>
-                              <p:par>
-                                <p:cTn presetID="10" fill="hold" presetSubtype="0" presetClass="exit" nodeType="withEffect">
-                                  <p:stCondLst>
-                                    <p:cond delay="0"/>
-                                  </p:stCondLst>
-                                  <p:childTnLst>
-                                    <p:animEffect transition="out" filter="fade">
-                                      <p:cBhvr>
-                                        <p:cTn dur="500"/>
-                                        <p:tgtEl>
-                                          <p:spTgt spid="115"/>
-                                        </p:tgtEl>
-                                      </p:cBhvr>
-                                    </p:animEffect>
-                                    <p:set>
-                                      <p:cBhvr>
-                                        <p:cTn dur="1" fill="hold">
-                                          <p:stCondLst>
-                                            <p:cond delay="500"/>
-                                          </p:stCondLst>
-                                        </p:cTn>
-                                        <p:tgtEl>
-                                          <p:spTgt spid="115"/>
+                                          <p:spTgt spid="121"/>
                                         </p:tgtEl>
                                         <p:attrNameLst>
                                           <p:attrName>style.visibility</p:attrName>
@@ -5767,12 +6027,12 @@
 </p:sld>
 </file>
 
-<file path=ppt/slides/slide12.xml><?xml version="1.0" encoding="utf-8"?>
+<file path=ppt/slides/slide13.xml><?xml version="1.0" encoding="utf-8"?>
 <p:sld xmlns:a="http://schemas.openxmlformats.org/drawingml/2006/main" xmlns:r="http://schemas.openxmlformats.org/officeDocument/2006/relationships" xmlns:mc="http://schemas.openxmlformats.org/markup-compatibility/2006" xmlns:mv="urn:schemas-microsoft-com:mac:vml" xmlns:p="http://schemas.openxmlformats.org/presentationml/2006/main" xmlns:c="http://schemas.openxmlformats.org/drawingml/2006/chart" xmlns:dgm="http://schemas.openxmlformats.org/drawingml/2006/diagram" xmlns:o="urn:schemas-microsoft-com:office:office" xmlns:v="urn:schemas-microsoft-com:vml" xmlns:pvml="urn:schemas-microsoft-com:office:powerpoint" xmlns:com="http://schemas.openxmlformats.org/drawingml/2006/compatibility" xmlns:p14="http://schemas.microsoft.com/office/powerpoint/2010/main">
   <p:cSld>
     <p:spTree>
       <p:nvGrpSpPr>
-        <p:cNvPr id="120" name="Shape 120"/>
+        <p:cNvPr id="126" name="Shape 126"/>
         <p:cNvGrpSpPr/>
         <p:nvPr/>
       </p:nvGrpSpPr>
@@ -5786,7 +6046,7 @@
       </p:grpSpPr>
       <p:sp>
         <p:nvSpPr>
-          <p:cNvPr id="121" name="Shape 121"/>
+          <p:cNvPr id="127" name="Shape 127"/>
           <p:cNvSpPr txBox="1"/>
           <p:nvPr>
             <p:ph type="title"/>
@@ -5822,7 +6082,7 @@
       </p:sp>
       <p:sp>
         <p:nvSpPr>
-          <p:cNvPr id="122" name="Shape 122"/>
+          <p:cNvPr id="128" name="Shape 128"/>
           <p:cNvSpPr txBox="1"/>
           <p:nvPr>
             <p:ph idx="1" type="body"/>
@@ -6013,7 +6273,7 @@
             </a:pPr>
             <a:r>
               <a:rPr lang="en"/>
-              <a:t>Demo URL</a:t>
+              <a:t>Andy Shinn</a:t>
             </a:r>
           </a:p>
         </p:txBody>
@@ -6041,21 +6301,95 @@
           </a:bodyPr>
           <a:lstStyle/>
           <a:p>
-            <a:pPr>
+            <a:pPr rtl="0">
               <a:spcBef>
                 <a:spcPts val="0"/>
               </a:spcBef>
               <a:buNone/>
             </a:pPr>
             <a:r>
-              <a:rPr u="sng" sz="3600" lang="en">
+              <a:rPr lang="en"/>
+              <a:t>Principal at Glider Labs</a:t>
+            </a:r>
+          </a:p>
+          <a:p>
+            <a:pPr rtl="0">
+              <a:spcBef>
+                <a:spcPts val="0"/>
+              </a:spcBef>
+              <a:buNone/>
+            </a:pPr>
+            <a:r>
+              <a:rPr u="sng" lang="en">
                 <a:solidFill>
                   <a:schemeClr val="hlink"/>
                 </a:solidFill>
                 <a:hlinkClick r:id="rId3"/>
               </a:rPr>
-              <a:t>github.com/andyshinn/sample-webapp</a:t>
-            </a:r>
+              <a:t>http://gliderlabs.com/</a:t>
+            </a:r>
+          </a:p>
+          <a:p>
+            <a:pPr rtl="0">
+              <a:spcBef>
+                <a:spcPts val="0"/>
+              </a:spcBef>
+              <a:buNone/>
+            </a:pPr>
+            <a:r>
+              <a:rPr u="sng" lang="en">
+                <a:solidFill>
+                  <a:schemeClr val="hlink"/>
+                </a:solidFill>
+                <a:hlinkClick r:id="rId4"/>
+              </a:rPr>
+              <a:t>andy@gliderlabs.com</a:t>
+            </a:r>
+          </a:p>
+          <a:p>
+            <a:pPr rtl="0">
+              <a:spcBef>
+                <a:spcPts val="0"/>
+              </a:spcBef>
+              <a:buNone/>
+            </a:pPr>
+            <a:r>
+              <a:t/>
+            </a:r>
+            <a:endParaRPr/>
+          </a:p>
+          <a:p>
+            <a:pPr rtl="0">
+              <a:spcBef>
+                <a:spcPts val="0"/>
+              </a:spcBef>
+              <a:buNone/>
+            </a:pPr>
+            <a:r>
+              <a:rPr lang="en"/>
+              <a:t>Email the team at </a:t>
+            </a:r>
+            <a:r>
+              <a:rPr u="sng" lang="en">
+                <a:solidFill>
+                  <a:schemeClr val="hlink"/>
+                </a:solidFill>
+                <a:hlinkClick r:id="rId5"/>
+              </a:rPr>
+              <a:t>team@gliderlabs.com</a:t>
+            </a:r>
+          </a:p>
+          <a:p>
+            <a:pPr>
+              <a:spcBef>
+                <a:spcPts val="0"/>
+              </a:spcBef>
+              <a:buNone/>
+            </a:pPr>
+            <a:r>
+              <a:t/>
+            </a:r>
+            <a:endParaRPr/>
           </a:p>
         </p:txBody>
       </p:sp>
@@ -6118,7 +6452,7 @@
             </a:pPr>
             <a:r>
               <a:rPr lang="en"/>
-              <a:t>Why service discovery?</a:t>
+              <a:t>Demo URL</a:t>
             </a:r>
           </a:p>
         </p:txBody>
@@ -6146,54 +6480,20 @@
           </a:bodyPr>
           <a:lstStyle/>
           <a:p>
-            <a:pPr rtl="0" lvl="0" indent="-419100" marL="457200">
-              <a:spcBef>
-                <a:spcPts val="0"/>
-              </a:spcBef>
-              <a:buClr>
-                <a:schemeClr val="dk1"/>
-              </a:buClr>
-              <a:buSzPct val="100000"/>
-              <a:buFont typeface="Arial"/>
-              <a:buChar char="●"/>
-            </a:pPr>
-            <a:r>
-              <a:rPr lang="en"/>
-              <a:t>Automatically configure applications</a:t>
-            </a:r>
-          </a:p>
-          <a:p>
-            <a:pPr rtl="0" lvl="0" indent="-419100" marL="457200">
-              <a:spcBef>
-                <a:spcPts val="0"/>
-              </a:spcBef>
-              <a:buClr>
-                <a:schemeClr val="dk1"/>
-              </a:buClr>
-              <a:buSzPct val="100000"/>
-              <a:buFont typeface="Arial"/>
-              <a:buChar char="●"/>
-            </a:pPr>
-            <a:r>
-              <a:rPr lang="en"/>
-              <a:t>Aides in high availability and fault tolerance</a:t>
-            </a:r>
-          </a:p>
-          <a:p>
-            <a:pPr lvl="0" indent="-419100" marL="457200">
-              <a:spcBef>
-                <a:spcPts val="0"/>
-              </a:spcBef>
-              <a:buClr>
-                <a:schemeClr val="dk1"/>
-              </a:buClr>
-              <a:buSzPct val="100000"/>
-              <a:buFont typeface="Arial"/>
-              <a:buChar char="●"/>
-            </a:pPr>
-            <a:r>
-              <a:rPr lang="en"/>
-              <a:t>Helps to scale horizontally</a:t>
+            <a:pPr>
+              <a:spcBef>
+                <a:spcPts val="0"/>
+              </a:spcBef>
+              <a:buNone/>
+            </a:pPr>
+            <a:r>
+              <a:rPr u="sng" sz="3600" lang="en">
+                <a:solidFill>
+                  <a:schemeClr val="hlink"/>
+                </a:solidFill>
+                <a:hlinkClick r:id="rId3"/>
+              </a:rPr>
+              <a:t>github.com/andyshinn/sample-webapp</a:t>
             </a:r>
           </a:p>
         </p:txBody>
@@ -6257,7 +6557,7 @@
             </a:pPr>
             <a:r>
               <a:rPr lang="en"/>
-              <a:t>Service discovery components</a:t>
+              <a:t>Why service discovery?</a:t>
             </a:r>
           </a:p>
         </p:txBody>
@@ -6298,7 +6598,7 @@
             </a:pPr>
             <a:r>
               <a:rPr lang="en"/>
-              <a:t>Directory (consistent key value stores)</a:t>
+              <a:t>Automatically configure applications</a:t>
             </a:r>
           </a:p>
           <a:p>
@@ -6315,11 +6615,11 @@
             </a:pPr>
             <a:r>
               <a:rPr lang="en"/>
-              <a:t>Registration / Deregistration (adding services to the directory and removing when unhealthy or gone)</a:t>
-            </a:r>
-          </a:p>
-          <a:p>
-            <a:pPr rtl="0" lvl="0" indent="-419100" marL="457200">
+              <a:t>Aides in high availability and fault tolerance</a:t>
+            </a:r>
+          </a:p>
+          <a:p>
+            <a:pPr lvl="0" indent="-419100" marL="457200">
               <a:spcBef>
                 <a:spcPts val="0"/>
               </a:spcBef>
@@ -6332,24 +6632,7 @@
             </a:pPr>
             <a:r>
               <a:rPr lang="en"/>
-              <a:t>Lookup (discovering and using the registered services)</a:t>
-            </a:r>
-          </a:p>
-          <a:p>
-            <a:pPr lvl="0" indent="-419100" marL="457200">
-              <a:spcBef>
-                <a:spcPts val="0"/>
-              </a:spcBef>
-              <a:buClr>
-                <a:schemeClr val="dk1"/>
-              </a:buClr>
-              <a:buSzPct val="100000"/>
-              <a:buFont typeface="Arial"/>
-              <a:buChar char="●"/>
-            </a:pPr>
-            <a:r>
-              <a:rPr lang="en"/>
-              <a:t>Health checks and monitoring</a:t>
+              <a:t>Helps to scale horizontally</a:t>
             </a:r>
           </a:p>
         </p:txBody>
@@ -6413,7 +6696,7 @@
             </a:pPr>
             <a:r>
               <a:rPr lang="en"/>
-              <a:t>Key / value stores</a:t>
+              <a:t>Service discovery components</a:t>
             </a:r>
           </a:p>
         </p:txBody>
@@ -6454,7 +6737,7 @@
             </a:pPr>
             <a:r>
               <a:rPr lang="en"/>
-              <a:t>ZooKeeper</a:t>
+              <a:t>Directory (consistent key value stores)</a:t>
             </a:r>
           </a:p>
           <a:p>
@@ -6471,7 +6754,7 @@
             </a:pPr>
             <a:r>
               <a:rPr lang="en"/>
-              <a:t>etcd</a:t>
+              <a:t>Registration / Deregistration (adding services to the directory and removing when unhealthy or gone)</a:t>
             </a:r>
           </a:p>
           <a:p>
@@ -6488,7 +6771,7 @@
             </a:pPr>
             <a:r>
               <a:rPr lang="en"/>
-              <a:t>Consul</a:t>
+              <a:t>Lookup (discovering and using the registered services)</a:t>
             </a:r>
           </a:p>
           <a:p>
@@ -6505,7 +6788,7 @@
             </a:pPr>
             <a:r>
               <a:rPr lang="en"/>
-              <a:t>Doozer</a:t>
+              <a:t>Health checks and monitoring</a:t>
             </a:r>
           </a:p>
         </p:txBody>
@@ -6569,7 +6852,7 @@
             </a:pPr>
             <a:r>
               <a:rPr lang="en"/>
-              <a:t>Registration and deregistration</a:t>
+              <a:t>Key / value stores</a:t>
             </a:r>
           </a:p>
         </p:txBody>
@@ -6610,7 +6893,7 @@
             </a:pPr>
             <a:r>
               <a:rPr lang="en"/>
-              <a:t>progrium/registrator</a:t>
+              <a:t>ZooKeeper</a:t>
             </a:r>
           </a:p>
           <a:p>
@@ -6627,7 +6910,7 @@
             </a:pPr>
             <a:r>
               <a:rPr lang="en"/>
-              <a:t>BlueDragonX/beacon</a:t>
+              <a:t>etcd</a:t>
             </a:r>
           </a:p>
           <a:p>
@@ -6644,11 +6927,11 @@
             </a:pPr>
             <a:r>
               <a:rPr lang="en"/>
-              <a:t>jwilder/docker-register</a:t>
-            </a:r>
-          </a:p>
-          <a:p>
-            <a:pPr rtl="0" lvl="0" indent="-419100" marL="457200">
+              <a:t>Consul</a:t>
+            </a:r>
+          </a:p>
+          <a:p>
+            <a:pPr lvl="0" indent="-419100" marL="457200">
               <a:spcBef>
                 <a:spcPts val="0"/>
               </a:spcBef>
@@ -6661,329 +6944,7 @@
             </a:pPr>
             <a:r>
               <a:rPr lang="en"/>
-              <a:t>Custom scripts:</a:t>
-            </a:r>
-          </a:p>
-          <a:p>
-            <a:pPr rtl="0" lvl="0">
-              <a:spcBef>
-                <a:spcPts val="0"/>
-              </a:spcBef>
-              <a:buNone/>
-            </a:pPr>
-            <a:r>
-              <a:rPr sz="1400" lang="en">
-                <a:solidFill>
-                  <a:srgbClr val="797997"/>
-                </a:solidFill>
-              </a:rPr>
-              <a:t>IP</a:t>
-            </a:r>
-            <a:r>
-              <a:rPr sz="1400" lang="en">
-                <a:solidFill>
-                  <a:srgbClr val="808030"/>
-                </a:solidFill>
-              </a:rPr>
-              <a:t>=</a:t>
-            </a:r>
-            <a:r>
-              <a:rPr sz="1400" lang="en"/>
-              <a:t>$</a:t>
-            </a:r>
-            <a:r>
-              <a:rPr sz="1400" lang="en">
-                <a:solidFill>
-                  <a:srgbClr val="800080"/>
-                </a:solidFill>
-              </a:rPr>
-              <a:t>(</a:t>
-            </a:r>
-            <a:r>
-              <a:rPr sz="1400" lang="en"/>
-              <a:t>ip addr show eth0 </a:t>
-            </a:r>
-            <a:r>
-              <a:rPr sz="1400" lang="en">
-                <a:solidFill>
-                  <a:srgbClr val="E34ADC"/>
-                </a:solidFill>
-              </a:rPr>
-              <a:t>|</a:t>
-            </a:r>
-            <a:r>
-              <a:rPr sz="1400" lang="en"/>
-              <a:t> awk </a:t>
-            </a:r>
-            <a:r>
-              <a:rPr sz="1400" lang="en">
-                <a:solidFill>
-                  <a:srgbClr val="0000E6"/>
-                </a:solidFill>
-              </a:rPr>
-              <a:t>'$1 == "inet" {gsub(/\/.*$/, "", $2); print $2}'</a:t>
-            </a:r>
-            <a:r>
-              <a:rPr sz="1400" lang="en">
-                <a:solidFill>
-                  <a:srgbClr val="800080"/>
-                </a:solidFill>
-              </a:rPr>
-              <a:t>)</a:t>
-            </a:r>
-            <a:br>
-              <a:rPr sz="1400" lang="en">
-                <a:solidFill>
-                  <a:srgbClr val="800080"/>
-                </a:solidFill>
-              </a:rPr>
-            </a:br>
-            <a:r>
-              <a:rPr sz="1400" lang="en">
-                <a:solidFill>
-                  <a:srgbClr val="797997"/>
-                </a:solidFill>
-              </a:rPr>
-              <a:t>PORT</a:t>
-            </a:r>
-            <a:r>
-              <a:rPr sz="1400" lang="en">
-                <a:solidFill>
-                  <a:srgbClr val="808030"/>
-                </a:solidFill>
-              </a:rPr>
-              <a:t>=</a:t>
-            </a:r>
-            <a:r>
-              <a:rPr sz="1400" lang="en"/>
-              <a:t>$</a:t>
-            </a:r>
-            <a:r>
-              <a:rPr sz="1400" lang="en">
-                <a:solidFill>
-                  <a:srgbClr val="800080"/>
-                </a:solidFill>
-              </a:rPr>
-              <a:t>(</a:t>
-            </a:r>
-            <a:r>
-              <a:rPr sz="1400" lang="en"/>
-              <a:t>docker inspect </a:t>
-            </a:r>
-            <a:r>
-              <a:rPr sz="1400" lang="en">
-                <a:solidFill>
-                  <a:srgbClr val="44AADD"/>
-                </a:solidFill>
-              </a:rPr>
-              <a:t>-f</a:t>
-            </a:r>
-            <a:r>
-              <a:rPr sz="1400" lang="en"/>
-              <a:t> </a:t>
-            </a:r>
-            <a:r>
-              <a:rPr sz="1400" lang="en">
-                <a:solidFill>
-                  <a:srgbClr val="0000E6"/>
-                </a:solidFill>
-              </a:rPr>
-              <a:t>'{{range $i, $e := .NetworkSettings.Ports }}{{$p := index $e 0}}{{$p.HostPort}}{{end}}'</a:t>
-            </a:r>
-            <a:r>
-              <a:rPr sz="1400" lang="en"/>
-              <a:t> container-name</a:t>
-            </a:r>
-            <a:r>
-              <a:rPr sz="1400" lang="en">
-                <a:solidFill>
-                  <a:srgbClr val="800080"/>
-                </a:solidFill>
-              </a:rPr>
-              <a:t>)</a:t>
-            </a:r>
-            <a:br>
-              <a:rPr sz="1400" lang="en">
-                <a:solidFill>
-                  <a:srgbClr val="800080"/>
-                </a:solidFill>
-              </a:rPr>
-            </a:br>
-            <a:br>
-              <a:rPr sz="1400" lang="en">
-                <a:solidFill>
-                  <a:srgbClr val="800080"/>
-                </a:solidFill>
-              </a:rPr>
-            </a:br>
-            <a:r>
-              <a:rPr b="1" sz="1400" lang="en">
-                <a:solidFill>
-                  <a:srgbClr val="800000"/>
-                </a:solidFill>
-              </a:rPr>
-              <a:t>while</a:t>
-            </a:r>
-            <a:r>
-              <a:rPr sz="1400" lang="en"/>
-              <a:t> netstat -lnt </a:t>
-            </a:r>
-            <a:r>
-              <a:rPr sz="1400" lang="en">
-                <a:solidFill>
-                  <a:srgbClr val="E34ADC"/>
-                </a:solidFill>
-              </a:rPr>
-              <a:t>|</a:t>
-            </a:r>
-            <a:r>
-              <a:rPr sz="1400" lang="en"/>
-              <a:t> grep -q </a:t>
-            </a:r>
-            <a:r>
-              <a:rPr sz="1400" lang="en">
-                <a:solidFill>
-                  <a:srgbClr val="0000E6"/>
-                </a:solidFill>
-              </a:rPr>
-              <a:t>"</a:t>
-            </a:r>
-            <a:r>
-              <a:rPr sz="1400" lang="en">
-                <a:solidFill>
-                  <a:srgbClr val="0000FF"/>
-                </a:solidFill>
-              </a:rPr>
-              <a:t>:</a:t>
-            </a:r>
-            <a:r>
-              <a:rPr sz="1400" lang="en">
-                <a:solidFill>
-                  <a:srgbClr val="797997"/>
-                </a:solidFill>
-              </a:rPr>
-              <a:t>$PORT</a:t>
-            </a:r>
-            <a:r>
-              <a:rPr sz="1400" lang="en">
-                <a:solidFill>
-                  <a:srgbClr val="0000E6"/>
-                </a:solidFill>
-              </a:rPr>
-              <a:t>"</a:t>
-            </a:r>
-            <a:r>
-              <a:rPr sz="1400" lang="en">
-                <a:solidFill>
-                  <a:srgbClr val="800080"/>
-                </a:solidFill>
-              </a:rPr>
-              <a:t>;</a:t>
-            </a:r>
-            <a:r>
-              <a:rPr sz="1400" lang="en"/>
-              <a:t> </a:t>
-            </a:r>
-            <a:r>
-              <a:rPr b="1" sz="1400" lang="en">
-                <a:solidFill>
-                  <a:srgbClr val="800000"/>
-                </a:solidFill>
-              </a:rPr>
-              <a:t>do</a:t>
-            </a:r>
-            <a:br>
-              <a:rPr sz="1400" lang="en"/>
-            </a:br>
-            <a:r>
-              <a:rPr sz="1400" lang="en"/>
-              <a:t>  etcdctl </a:t>
-            </a:r>
-            <a:r>
-              <a:rPr b="1" sz="1400" lang="en">
-                <a:solidFill>
-                  <a:srgbClr val="BB7977"/>
-                </a:solidFill>
-              </a:rPr>
-              <a:t>set</a:t>
-            </a:r>
-            <a:r>
-              <a:rPr sz="1400" lang="en"/>
-              <a:t> </a:t>
-            </a:r>
-            <a:r>
-              <a:rPr sz="1400" lang="en">
-                <a:solidFill>
-                  <a:srgbClr val="40015A"/>
-                </a:solidFill>
-              </a:rPr>
-              <a:t>/application/service/container-name</a:t>
-            </a:r>
-            <a:r>
-              <a:rPr sz="1400" lang="en"/>
-              <a:t> </a:t>
-            </a:r>
-            <a:r>
-              <a:rPr sz="1400" lang="en">
-                <a:solidFill>
-                  <a:srgbClr val="797997"/>
-                </a:solidFill>
-              </a:rPr>
-              <a:t>$IP</a:t>
-            </a:r>
-            <a:r>
-              <a:rPr sz="1400" lang="en">
-                <a:solidFill>
-                  <a:srgbClr val="808030"/>
-                </a:solidFill>
-              </a:rPr>
-              <a:t>:</a:t>
-            </a:r>
-            <a:r>
-              <a:rPr sz="1400" lang="en">
-                <a:solidFill>
-                  <a:srgbClr val="797997"/>
-                </a:solidFill>
-              </a:rPr>
-              <a:t>$PORT</a:t>
-            </a:r>
-            <a:r>
-              <a:rPr sz="1400" lang="en"/>
-              <a:t> --ttl </a:t>
-            </a:r>
-            <a:r>
-              <a:rPr sz="1400" lang="en">
-                <a:solidFill>
-                  <a:srgbClr val="008C00"/>
-                </a:solidFill>
-              </a:rPr>
-              <a:t>300</a:t>
-            </a:r>
-            <a:br>
-              <a:rPr sz="1400" lang="en"/>
-            </a:br>
-            <a:r>
-              <a:rPr sz="1400" lang="en"/>
-              <a:t>  sleep </a:t>
-            </a:r>
-            <a:r>
-              <a:rPr sz="1400" lang="en">
-                <a:solidFill>
-                  <a:srgbClr val="008C00"/>
-                </a:solidFill>
-              </a:rPr>
-              <a:t>200</a:t>
-            </a:r>
-            <a:br>
-              <a:rPr sz="1400" lang="en"/>
-            </a:br>
-            <a:r>
-              <a:rPr b="1" sz="1400" lang="en">
-                <a:solidFill>
-                  <a:srgbClr val="800000"/>
-                </a:solidFill>
-              </a:rPr>
-              <a:t>done</a:t>
+              <a:t>Doozer</a:t>
             </a:r>
           </a:p>
         </p:txBody>
@@ -7047,7 +7008,7 @@
             </a:pPr>
             <a:r>
               <a:rPr lang="en"/>
-              <a:t>Discovery and lookup</a:t>
+              <a:t>Registration and deregistration</a:t>
             </a:r>
           </a:p>
         </p:txBody>
@@ -7088,7 +7049,7 @@
             </a:pPr>
             <a:r>
               <a:rPr lang="en"/>
-              <a:t>confd</a:t>
+              <a:t>progrium/registrator</a:t>
             </a:r>
           </a:p>
           <a:p>
@@ -7105,7 +7066,7 @@
             </a:pPr>
             <a:r>
               <a:rPr lang="en"/>
-              <a:t>Sentinel</a:t>
+              <a:t>BlueDragonX/beacon</a:t>
             </a:r>
           </a:p>
           <a:p>
@@ -7122,7 +7083,7 @@
             </a:pPr>
             <a:r>
               <a:rPr lang="en"/>
-              <a:t>envconsul (and envetcd)</a:t>
+              <a:t>jwilder/docker-register</a:t>
             </a:r>
           </a:p>
           <a:p>
@@ -7139,39 +7100,26 @@
             </a:pPr>
             <a:r>
               <a:rPr lang="en"/>
-              <a:t>vulcand (router with in-process lookup)</a:t>
-            </a:r>
-          </a:p>
-          <a:p>
-            <a:pPr rtl="0" lvl="0" indent="-419100" marL="457200">
-              <a:spcBef>
-                <a:spcPts val="0"/>
-              </a:spcBef>
-              <a:buClr>
-                <a:schemeClr val="dk1"/>
-              </a:buClr>
-              <a:buSzPct val="100000"/>
-              <a:buFont typeface="Arial"/>
-              <a:buChar char="●"/>
-            </a:pPr>
-            <a:r>
-              <a:rPr lang="en"/>
-              <a:t>your own app in-process:</a:t>
-            </a:r>
-          </a:p>
-          <a:p>
-            <a:pPr rtl="0" lvl="0" indent="0">
+              <a:t>Custom scripts:</a:t>
+            </a:r>
+          </a:p>
+          <a:p>
+            <a:pPr rtl="0" lvl="0">
               <a:spcBef>
                 <a:spcPts val="0"/>
               </a:spcBef>
               <a:buNone/>
             </a:pPr>
             <a:r>
-              <a:rPr sz="1800" lang="en"/>
-              <a:t>       client </a:t>
-            </a:r>
-            <a:r>
-              <a:rPr sz="1800" lang="en">
+              <a:rPr sz="1400" lang="en">
+                <a:solidFill>
+                  <a:srgbClr val="797997"/>
+                </a:solidFill>
+              </a:rPr>
+              <a:t>IP</a:t>
+            </a:r>
+            <a:r>
+              <a:rPr sz="1400" lang="en">
                 <a:solidFill>
                   <a:srgbClr val="808030"/>
                 </a:solidFill>
@@ -7179,35 +7127,66 @@
               <a:t>=</a:t>
             </a:r>
             <a:r>
-              <a:rPr sz="1800" lang="en"/>
-              <a:t> etcd</a:t>
-            </a:r>
-            <a:r>
-              <a:rPr sz="1800" lang="en">
-                <a:solidFill>
-                  <a:srgbClr val="808030"/>
-                </a:solidFill>
-              </a:rPr>
-              <a:t>.</a:t>
-            </a:r>
-            <a:r>
-              <a:rPr sz="1800" lang="en"/>
-              <a:t>Client</a:t>
-            </a:r>
-            <a:r>
-              <a:rPr sz="1800" lang="en">
-                <a:solidFill>
-                  <a:srgbClr val="808030"/>
+              <a:rPr sz="1400" lang="en"/>
+              <a:t>$</a:t>
+            </a:r>
+            <a:r>
+              <a:rPr sz="1400" lang="en">
+                <a:solidFill>
+                  <a:srgbClr val="800080"/>
                 </a:solidFill>
               </a:rPr>
               <a:t>(</a:t>
             </a:r>
             <a:r>
-              <a:rPr sz="1800" lang="en"/>
-              <a:t>host</a:t>
-            </a:r>
-            <a:r>
-              <a:rPr sz="1800" lang="en">
+              <a:rPr sz="1400" lang="en"/>
+              <a:t>ip addr show eth0 </a:t>
+            </a:r>
+            <a:r>
+              <a:rPr sz="1400" lang="en">
+                <a:solidFill>
+                  <a:srgbClr val="E34ADC"/>
+                </a:solidFill>
+              </a:rPr>
+              <a:t>|</a:t>
+            </a:r>
+            <a:r>
+              <a:rPr sz="1400" lang="en"/>
+              <a:t> awk </a:t>
+            </a:r>
+            <a:r>
+              <a:rPr sz="1400" lang="en">
+                <a:solidFill>
+                  <a:srgbClr val="0000E6"/>
+                </a:solidFill>
+              </a:rPr>
+              <a:t>'$1 == "inet" {gsub(/\/.*$/, "", $2); print $2}'</a:t>
+            </a:r>
+            <a:r>
+              <a:rPr sz="1400" lang="en">
+                <a:solidFill>
+                  <a:srgbClr val="800080"/>
+                </a:solidFill>
+              </a:rPr>
+              <a:t>)</a:t>
+            </a:r>
+            <a:br>
+              <a:rPr sz="1400" lang="en">
+                <a:solidFill>
+                  <a:srgbClr val="800080"/>
+                </a:solidFill>
+              </a:rPr>
+            </a:br>
+            <a:r>
+              <a:rPr sz="1400" lang="en">
+                <a:solidFill>
+                  <a:srgbClr val="797997"/>
+                </a:solidFill>
+              </a:rPr>
+              <a:t>PORT</a:t>
+            </a:r>
+            <a:r>
+              <a:rPr sz="1400" lang="en">
                 <a:solidFill>
                   <a:srgbClr val="808030"/>
                 </a:solidFill>
@@ -7215,345 +7194,235 @@
               <a:t>=</a:t>
             </a:r>
             <a:r>
-              <a:rPr sz="1800" lang="en"/>
-              <a:t>os</a:t>
-            </a:r>
-            <a:r>
-              <a:rPr sz="1800" lang="en">
-                <a:solidFill>
-                  <a:srgbClr val="808030"/>
-                </a:solidFill>
-              </a:rPr>
-              <a:t>.</a:t>
-            </a:r>
-            <a:r>
-              <a:rPr sz="1800" lang="en"/>
-              <a:t>environ</a:t>
-            </a:r>
-            <a:r>
-              <a:rPr sz="1800" lang="en">
-                <a:solidFill>
-                  <a:srgbClr val="808030"/>
-                </a:solidFill>
-              </a:rPr>
-              <a:t>.</a:t>
-            </a:r>
-            <a:r>
-              <a:rPr sz="1800" lang="en"/>
-              <a:t>get</a:t>
-            </a:r>
-            <a:r>
-              <a:rPr sz="1800" lang="en">
-                <a:solidFill>
-                  <a:srgbClr val="808030"/>
+              <a:rPr sz="1400" lang="en"/>
+              <a:t>$</a:t>
+            </a:r>
+            <a:r>
+              <a:rPr sz="1400" lang="en">
+                <a:solidFill>
+                  <a:srgbClr val="800080"/>
                 </a:solidFill>
               </a:rPr>
               <a:t>(</a:t>
             </a:r>
             <a:r>
-              <a:rPr sz="1800" lang="en">
+              <a:rPr sz="1400" lang="en"/>
+              <a:t>docker inspect </a:t>
+            </a:r>
+            <a:r>
+              <a:rPr sz="1400" lang="en">
+                <a:solidFill>
+                  <a:srgbClr val="44AADD"/>
+                </a:solidFill>
+              </a:rPr>
+              <a:t>-f</a:t>
+            </a:r>
+            <a:r>
+              <a:rPr sz="1400" lang="en"/>
+              <a:t> </a:t>
+            </a:r>
+            <a:r>
+              <a:rPr sz="1400" lang="en">
                 <a:solidFill>
                   <a:srgbClr val="0000E6"/>
                 </a:solidFill>
               </a:rPr>
-              <a:t>'ETCD_HOST'</a:t>
-            </a:r>
-            <a:r>
-              <a:rPr sz="1800" lang="en">
-                <a:solidFill>
-                  <a:srgbClr val="808030"/>
-                </a:solidFill>
-              </a:rPr>
-              <a:t>,</a:t>
-            </a:r>
-            <a:r>
-              <a:rPr sz="1800" lang="en"/>
-              <a:t> </a:t>
-            </a:r>
-            <a:r>
-              <a:rPr sz="1800" lang="en">
-                <a:solidFill>
-                  <a:srgbClr val="0000E6"/>
-                </a:solidFill>
-              </a:rPr>
-              <a:t>'10.1.42.1'</a:t>
-            </a:r>
-            <a:r>
-              <a:rPr sz="1800" lang="en">
-                <a:solidFill>
-                  <a:srgbClr val="808030"/>
-                </a:solidFill>
-              </a:rPr>
-              <a:t>))</a:t>
-            </a:r>
-            <a:br>
-              <a:rPr sz="1800" lang="en"/>
-            </a:br>
-            <a:r>
-              <a:rPr sz="1800" lang="en"/>
-              <a:t>       key </a:t>
-            </a:r>
-            <a:r>
-              <a:rPr sz="1800" lang="en">
-                <a:solidFill>
-                  <a:srgbClr val="808030"/>
-                </a:solidFill>
-              </a:rPr>
-              <a:t>=</a:t>
-            </a:r>
-            <a:r>
-              <a:rPr sz="1800" lang="en"/>
-              <a:t> </a:t>
-            </a:r>
-            <a:r>
-              <a:rPr sz="1800" lang="en">
-                <a:solidFill>
-                  <a:srgbClr val="E34ADC"/>
-                </a:solidFill>
-              </a:rPr>
-              <a:t>str</a:t>
-            </a:r>
-            <a:r>
-              <a:rPr sz="1800" lang="en">
-                <a:solidFill>
-                  <a:srgbClr val="808030"/>
-                </a:solidFill>
-              </a:rPr>
-              <a:t>(</a:t>
-            </a:r>
-            <a:r>
-              <a:rPr sz="1800" lang="en"/>
-              <a:t>client</a:t>
-            </a:r>
-            <a:r>
-              <a:rPr sz="1800" lang="en">
-                <a:solidFill>
-                  <a:srgbClr val="808030"/>
-                </a:solidFill>
-              </a:rPr>
-              <a:t>.</a:t>
-            </a:r>
-            <a:r>
-              <a:rPr sz="1800" lang="en"/>
-              <a:t>read</a:t>
-            </a:r>
-            <a:r>
-              <a:rPr sz="1800" lang="en">
-                <a:solidFill>
-                  <a:srgbClr val="808030"/>
-                </a:solidFill>
-              </a:rPr>
-              <a:t>(</a:t>
-            </a:r>
-            <a:r>
-              <a:rPr sz="1800" lang="en">
-                <a:solidFill>
-                  <a:srgbClr val="0000E6"/>
-                </a:solidFill>
-              </a:rPr>
-              <a:t>'/app/services/redis'</a:t>
-            </a:r>
-            <a:r>
-              <a:rPr sz="1800" lang="en">
-                <a:solidFill>
-                  <a:srgbClr val="808030"/>
-                </a:solidFill>
-              </a:rPr>
-              <a:t>).</a:t>
-            </a:r>
-            <a:r>
-              <a:rPr sz="1800" lang="en"/>
-              <a:t>_children</a:t>
-            </a:r>
-            <a:r>
-              <a:rPr sz="1800" lang="en">
-                <a:solidFill>
-                  <a:srgbClr val="808030"/>
-                </a:solidFill>
-              </a:rPr>
-              <a:t>[</a:t>
-            </a:r>
-            <a:r>
-              <a:rPr sz="1800" lang="en">
-                <a:solidFill>
-                  <a:srgbClr val="008C00"/>
-                </a:solidFill>
-              </a:rPr>
-              <a:t>0</a:t>
-            </a:r>
-            <a:r>
-              <a:rPr sz="1800" lang="en">
-                <a:solidFill>
-                  <a:srgbClr val="808030"/>
-                </a:solidFill>
-              </a:rPr>
-              <a:t>][</a:t>
-            </a:r>
-            <a:r>
-              <a:rPr sz="1800" lang="en">
-                <a:solidFill>
-                  <a:srgbClr val="0000E6"/>
-                </a:solidFill>
-              </a:rPr>
-              <a:t>'value'</a:t>
-            </a:r>
-            <a:r>
-              <a:rPr sz="1800" lang="en">
-                <a:solidFill>
-                  <a:srgbClr val="808030"/>
-                </a:solidFill>
-              </a:rPr>
-              <a:t>])</a:t>
-            </a:r>
-            <a:br>
-              <a:rPr sz="1800" lang="en"/>
-            </a:br>
-            <a:r>
-              <a:rPr sz="1800" lang="en"/>
-              <a:t>       redis_url </a:t>
-            </a:r>
-            <a:r>
-              <a:rPr sz="1800" lang="en">
-                <a:solidFill>
-                  <a:srgbClr val="808030"/>
-                </a:solidFill>
-              </a:rPr>
-              <a:t>=</a:t>
-            </a:r>
-            <a:r>
-              <a:rPr sz="1800" lang="en"/>
-              <a:t> </a:t>
-            </a:r>
-            <a:r>
-              <a:rPr sz="1800" lang="en">
-                <a:solidFill>
-                  <a:srgbClr val="0000E6"/>
-                </a:solidFill>
-              </a:rPr>
-              <a:t>'redis://{0}/0'</a:t>
-            </a:r>
-            <a:r>
-              <a:rPr sz="1800" lang="en">
-                <a:solidFill>
-                  <a:srgbClr val="808030"/>
-                </a:solidFill>
-              </a:rPr>
-              <a:t>.</a:t>
-            </a:r>
-            <a:r>
-              <a:rPr sz="1800" lang="en"/>
-              <a:t>format</a:t>
-            </a:r>
-            <a:r>
-              <a:rPr sz="1800" lang="en">
-                <a:solidFill>
-                  <a:srgbClr val="808030"/>
-                </a:solidFill>
-              </a:rPr>
-              <a:t>(</a:t>
-            </a:r>
-            <a:r>
-              <a:rPr sz="1800" lang="en"/>
-              <a:t>key</a:t>
-            </a:r>
-            <a:r>
-              <a:rPr sz="1800" lang="en">
-                <a:solidFill>
-                  <a:srgbClr val="808030"/>
+              <a:t>'{{range $i, $e := .NetworkSettings.Ports }}{{$p := index $e 0}}{{$p.HostPort}}{{end}}'</a:t>
+            </a:r>
+            <a:r>
+              <a:rPr sz="1400" lang="en"/>
+              <a:t> container-name</a:t>
+            </a:r>
+            <a:r>
+              <a:rPr sz="1400" lang="en">
+                <a:solidFill>
+                  <a:srgbClr val="800080"/>
                 </a:solidFill>
               </a:rPr>
               <a:t>)</a:t>
             </a:r>
             <a:br>
-              <a:rPr sz="1800" lang="en"/>
+              <a:rPr sz="1400" lang="en">
+                <a:solidFill>
+                  <a:srgbClr val="800080"/>
+                </a:solidFill>
+              </a:rPr>
             </a:br>
-            <a:r>
-              <a:rPr sz="1800" lang="en"/>
-              <a:t>       count </a:t>
-            </a:r>
-            <a:r>
-              <a:rPr sz="1800" lang="en">
+            <a:br>
+              <a:rPr sz="1400" lang="en">
+                <a:solidFill>
+                  <a:srgbClr val="800080"/>
+                </a:solidFill>
+              </a:rPr>
+            </a:br>
+            <a:r>
+              <a:rPr b="1" sz="1400" lang="en">
+                <a:solidFill>
+                  <a:srgbClr val="800000"/>
+                </a:solidFill>
+              </a:rPr>
+              <a:t>while</a:t>
+            </a:r>
+            <a:r>
+              <a:rPr sz="1400" lang="en"/>
+              <a:t> netstat -lnt </a:t>
+            </a:r>
+            <a:r>
+              <a:rPr sz="1400" lang="en">
+                <a:solidFill>
+                  <a:srgbClr val="E34ADC"/>
+                </a:solidFill>
+              </a:rPr>
+              <a:t>|</a:t>
+            </a:r>
+            <a:r>
+              <a:rPr sz="1400" lang="en"/>
+              <a:t> grep -q </a:t>
+            </a:r>
+            <a:r>
+              <a:rPr sz="1400" lang="en">
+                <a:solidFill>
+                  <a:srgbClr val="0000E6"/>
+                </a:solidFill>
+              </a:rPr>
+              <a:t>"</a:t>
+            </a:r>
+            <a:r>
+              <a:rPr sz="1400" lang="en">
+                <a:solidFill>
+                  <a:srgbClr val="0000FF"/>
+                </a:solidFill>
+              </a:rPr>
+              <a:t>:</a:t>
+            </a:r>
+            <a:r>
+              <a:rPr sz="1400" lang="en">
+                <a:solidFill>
+                  <a:srgbClr val="797997"/>
+                </a:solidFill>
+              </a:rPr>
+              <a:t>$PORT</a:t>
+            </a:r>
+            <a:r>
+              <a:rPr sz="1400" lang="en">
+                <a:solidFill>
+                  <a:srgbClr val="0000E6"/>
+                </a:solidFill>
+              </a:rPr>
+              <a:t>"</a:t>
+            </a:r>
+            <a:r>
+              <a:rPr sz="1400" lang="en">
+                <a:solidFill>
+                  <a:srgbClr val="800080"/>
+                </a:solidFill>
+              </a:rPr>
+              <a:t>;</a:t>
+            </a:r>
+            <a:r>
+              <a:rPr sz="1400" lang="en"/>
+              <a:t> </a:t>
+            </a:r>
+            <a:r>
+              <a:rPr b="1" sz="1400" lang="en">
+                <a:solidFill>
+                  <a:srgbClr val="800000"/>
+                </a:solidFill>
+              </a:rPr>
+              <a:t>do</a:t>
+            </a:r>
+            <a:br>
+              <a:rPr sz="1400" lang="en"/>
+            </a:br>
+            <a:r>
+              <a:rPr sz="1400" lang="en"/>
+              <a:t>  etcdctl </a:t>
+            </a:r>
+            <a:r>
+              <a:rPr b="1" sz="1400" lang="en">
+                <a:solidFill>
+                  <a:srgbClr val="BB7977"/>
+                </a:solidFill>
+              </a:rPr>
+              <a:t>set</a:t>
+            </a:r>
+            <a:r>
+              <a:rPr sz="1400" lang="en"/>
+              <a:t> </a:t>
+            </a:r>
+            <a:r>
+              <a:rPr sz="1400" lang="en">
+                <a:solidFill>
+                  <a:srgbClr val="40015A"/>
+                </a:solidFill>
+              </a:rPr>
+              <a:t>/application/service/container-name</a:t>
+            </a:r>
+            <a:r>
+              <a:rPr sz="1400" lang="en"/>
+              <a:t> </a:t>
+            </a:r>
+            <a:r>
+              <a:rPr sz="1400" lang="en">
+                <a:solidFill>
+                  <a:srgbClr val="797997"/>
+                </a:solidFill>
+              </a:rPr>
+              <a:t>$IP</a:t>
+            </a:r>
+            <a:r>
+              <a:rPr sz="1400" lang="en">
                 <a:solidFill>
                   <a:srgbClr val="808030"/>
                 </a:solidFill>
               </a:rPr>
-              <a:t>=</a:t>
-            </a:r>
-            <a:r>
-              <a:rPr sz="1800" lang="en"/>
-              <a:t> redis</a:t>
-            </a:r>
-            <a:r>
-              <a:rPr sz="1800" lang="en">
-                <a:solidFill>
-                  <a:srgbClr val="808030"/>
+              <a:t>:</a:t>
+            </a:r>
+            <a:r>
+              <a:rPr sz="1400" lang="en">
+                <a:solidFill>
+                  <a:srgbClr val="797997"/>
                 </a:solidFill>
               </a:rPr>
-              <a:t>.</a:t>
-            </a:r>
-            <a:r>
-              <a:rPr sz="1800" lang="en"/>
-              <a:t>StrictRedis</a:t>
-            </a:r>
-            <a:r>
-              <a:rPr sz="1800" lang="en">
-                <a:solidFill>
-                  <a:srgbClr val="808030"/>
+              <a:t>$PORT</a:t>
+            </a:r>
+            <a:r>
+              <a:rPr sz="1400" lang="en"/>
+              <a:t> --ttl </a:t>
+            </a:r>
+            <a:r>
+              <a:rPr sz="1400" lang="en">
+                <a:solidFill>
+                  <a:srgbClr val="008C00"/>
                 </a:solidFill>
               </a:rPr>
-              <a:t>.</a:t>
-            </a:r>
-            <a:r>
-              <a:rPr sz="1800" lang="en"/>
-              <a:t>from_url</a:t>
-            </a:r>
-            <a:r>
-              <a:rPr sz="1800" lang="en">
-                <a:solidFill>
-                  <a:srgbClr val="808030"/>
+              <a:t>300</a:t>
+            </a:r>
+            <a:br>
+              <a:rPr sz="1400" lang="en"/>
+            </a:br>
+            <a:r>
+              <a:rPr sz="1400" lang="en"/>
+              <a:t>  sleep </a:t>
+            </a:r>
+            <a:r>
+              <a:rPr sz="1400" lang="en">
+                <a:solidFill>
+                  <a:srgbClr val="008C00"/>
                 </a:solidFill>
               </a:rPr>
-              <a:t>(</a:t>
-            </a:r>
-            <a:r>
-              <a:rPr sz="1800" lang="en"/>
-              <a:t>redis_url</a:t>
-            </a:r>
-            <a:r>
-              <a:rPr sz="1800" lang="en">
-                <a:solidFill>
-                  <a:srgbClr val="808030"/>
+              <a:t>200</a:t>
+            </a:r>
+            <a:br>
+              <a:rPr sz="1400" lang="en"/>
+            </a:br>
+            <a:r>
+              <a:rPr b="1" sz="1400" lang="en">
+                <a:solidFill>
+                  <a:srgbClr val="800000"/>
                 </a:solidFill>
               </a:rPr>
-              <a:t>).</a:t>
-            </a:r>
-            <a:r>
-              <a:rPr sz="1800" lang="en"/>
-              <a:t>incr</a:t>
-            </a:r>
-            <a:r>
-              <a:rPr sz="1800" lang="en">
-                <a:solidFill>
-                  <a:srgbClr val="808030"/>
-                </a:solidFill>
-              </a:rPr>
-              <a:t>(</a:t>
-            </a:r>
-            <a:r>
-              <a:rPr sz="1800" lang="en">
-                <a:solidFill>
-                  <a:srgbClr val="0000E6"/>
-                </a:solidFill>
-              </a:rPr>
-              <a:t>"counter"</a:t>
-            </a:r>
-            <a:r>
-              <a:rPr sz="1800" lang="en">
-                <a:solidFill>
-                  <a:srgbClr val="808030"/>
-                </a:solidFill>
-              </a:rPr>
-              <a:t>)</a:t>
+              <a:t>done</a:t>
             </a:r>
           </a:p>
         </p:txBody>
@@ -7617,7 +7486,7 @@
             </a:pPr>
             <a:r>
               <a:rPr lang="en"/>
-              <a:t>Health checks and monitoring</a:t>
+              <a:t>Discovery and lookup</a:t>
             </a:r>
           </a:p>
         </p:txBody>
@@ -7645,18 +7514,6 @@
           </a:bodyPr>
           <a:lstStyle/>
           <a:p>
-            <a:pPr rtl="0">
-              <a:spcBef>
-                <a:spcPts val="0"/>
-              </a:spcBef>
-              <a:buNone/>
-            </a:pPr>
-            <a:r>
-              <a:rPr lang="en"/>
-              <a:t>Active</a:t>
-            </a:r>
-          </a:p>
-          <a:p>
             <a:pPr rtl="0" lvl="0" indent="-419100" marL="457200">
               <a:spcBef>
                 <a:spcPts val="0"/>
@@ -7670,23 +7527,11 @@
             </a:pPr>
             <a:r>
               <a:rPr lang="en"/>
-              <a:t>Consul health checks</a:t>
-            </a:r>
-          </a:p>
-          <a:p>
-            <a:pPr rtl="0">
-              <a:spcBef>
-                <a:spcPts val="0"/>
-              </a:spcBef>
-              <a:buNone/>
-            </a:pPr>
-            <a:r>
-              <a:rPr lang="en"/>
-              <a:t>Passive</a:t>
-            </a:r>
-          </a:p>
-          <a:p>
-            <a:pPr lvl="0" indent="-419100" marL="457200">
+              <a:t>confd</a:t>
+            </a:r>
+          </a:p>
+          <a:p>
+            <a:pPr rtl="0" lvl="0" indent="-419100" marL="457200">
               <a:spcBef>
                 <a:spcPts val="0"/>
               </a:spcBef>
@@ -7699,7 +7544,455 @@
             </a:pPr>
             <a:r>
               <a:rPr lang="en"/>
-              <a:t>Heartbeats with TTLs</a:t>
+              <a:t>Sentinel</a:t>
+            </a:r>
+          </a:p>
+          <a:p>
+            <a:pPr rtl="0" lvl="0" indent="-419100" marL="457200">
+              <a:spcBef>
+                <a:spcPts val="0"/>
+              </a:spcBef>
+              <a:buClr>
+                <a:schemeClr val="dk1"/>
+              </a:buClr>
+              <a:buSzPct val="100000"/>
+              <a:buFont typeface="Arial"/>
+              <a:buChar char="●"/>
+            </a:pPr>
+            <a:r>
+              <a:rPr lang="en"/>
+              <a:t>envconsul (and envetcd)</a:t>
+            </a:r>
+          </a:p>
+          <a:p>
+            <a:pPr rtl="0" lvl="0" indent="-419100" marL="457200">
+              <a:spcBef>
+                <a:spcPts val="0"/>
+              </a:spcBef>
+              <a:buClr>
+                <a:schemeClr val="dk1"/>
+              </a:buClr>
+              <a:buSzPct val="100000"/>
+              <a:buFont typeface="Arial"/>
+              <a:buChar char="●"/>
+            </a:pPr>
+            <a:r>
+              <a:rPr lang="en"/>
+              <a:t>vulcand (router with in-process lookup)</a:t>
+            </a:r>
+          </a:p>
+          <a:p>
+            <a:pPr rtl="0" lvl="0" indent="-419100" marL="457200">
+              <a:spcBef>
+                <a:spcPts val="0"/>
+              </a:spcBef>
+              <a:buClr>
+                <a:schemeClr val="dk1"/>
+              </a:buClr>
+              <a:buSzPct val="100000"/>
+              <a:buFont typeface="Arial"/>
+              <a:buChar char="●"/>
+            </a:pPr>
+            <a:r>
+              <a:rPr lang="en"/>
+              <a:t>your own app in-process:</a:t>
+            </a:r>
+          </a:p>
+          <a:p>
+            <a:pPr rtl="0" lvl="0" indent="0">
+              <a:spcBef>
+                <a:spcPts val="0"/>
+              </a:spcBef>
+              <a:buNone/>
+            </a:pPr>
+            <a:r>
+              <a:rPr sz="1800" lang="en"/>
+              <a:t>       client </a:t>
+            </a:r>
+            <a:r>
+              <a:rPr sz="1800" lang="en">
+                <a:solidFill>
+                  <a:srgbClr val="808030"/>
+                </a:solidFill>
+              </a:rPr>
+              <a:t>=</a:t>
+            </a:r>
+            <a:r>
+              <a:rPr sz="1800" lang="en"/>
+              <a:t> etcd</a:t>
+            </a:r>
+            <a:r>
+              <a:rPr sz="1800" lang="en">
+                <a:solidFill>
+                  <a:srgbClr val="808030"/>
+                </a:solidFill>
+              </a:rPr>
+              <a:t>.</a:t>
+            </a:r>
+            <a:r>
+              <a:rPr sz="1800" lang="en"/>
+              <a:t>Client</a:t>
+            </a:r>
+            <a:r>
+              <a:rPr sz="1800" lang="en">
+                <a:solidFill>
+                  <a:srgbClr val="808030"/>
+                </a:solidFill>
+              </a:rPr>
+              <a:t>(</a:t>
+            </a:r>
+            <a:r>
+              <a:rPr sz="1800" lang="en"/>
+              <a:t>host</a:t>
+            </a:r>
+            <a:r>
+              <a:rPr sz="1800" lang="en">
+                <a:solidFill>
+                  <a:srgbClr val="808030"/>
+                </a:solidFill>
+              </a:rPr>
+              <a:t>=</a:t>
+            </a:r>
+            <a:r>
+              <a:rPr sz="1800" lang="en"/>
+              <a:t>os</a:t>
+            </a:r>
+            <a:r>
+              <a:rPr sz="1800" lang="en">
+                <a:solidFill>
+                  <a:srgbClr val="808030"/>
+                </a:solidFill>
+              </a:rPr>
+              <a:t>.</a:t>
+            </a:r>
+            <a:r>
+              <a:rPr sz="1800" lang="en"/>
+              <a:t>environ</a:t>
+            </a:r>
+            <a:r>
+              <a:rPr sz="1800" lang="en">
+                <a:solidFill>
+                  <a:srgbClr val="808030"/>
+                </a:solidFill>
+              </a:rPr>
+              <a:t>.</a:t>
+            </a:r>
+            <a:r>
+              <a:rPr sz="1800" lang="en"/>
+              <a:t>get</a:t>
+            </a:r>
+            <a:r>
+              <a:rPr sz="1800" lang="en">
+                <a:solidFill>
+                  <a:srgbClr val="808030"/>
+                </a:solidFill>
+              </a:rPr>
+              <a:t>(</a:t>
+            </a:r>
+            <a:r>
+              <a:rPr sz="1800" lang="en">
+                <a:solidFill>
+                  <a:srgbClr val="0000E6"/>
+                </a:solidFill>
+              </a:rPr>
+              <a:t>'ETCD_HOST'</a:t>
+            </a:r>
+            <a:r>
+              <a:rPr sz="1800" lang="en">
+                <a:solidFill>
+                  <a:srgbClr val="808030"/>
+                </a:solidFill>
+              </a:rPr>
+              <a:t>,</a:t>
+            </a:r>
+            <a:r>
+              <a:rPr sz="1800" lang="en"/>
+              <a:t> </a:t>
+            </a:r>
+            <a:r>
+              <a:rPr sz="1800" lang="en">
+                <a:solidFill>
+                  <a:srgbClr val="0000E6"/>
+                </a:solidFill>
+              </a:rPr>
+              <a:t>'10.1.42.1'</a:t>
+            </a:r>
+            <a:r>
+              <a:rPr sz="1800" lang="en">
+                <a:solidFill>
+                  <a:srgbClr val="808030"/>
+                </a:solidFill>
+              </a:rPr>
+              <a:t>))</a:t>
+            </a:r>
+            <a:br>
+              <a:rPr sz="1800" lang="en"/>
+            </a:br>
+            <a:r>
+              <a:rPr sz="1800" lang="en"/>
+              <a:t>       key </a:t>
+            </a:r>
+            <a:r>
+              <a:rPr sz="1800" lang="en">
+                <a:solidFill>
+                  <a:srgbClr val="808030"/>
+                </a:solidFill>
+              </a:rPr>
+              <a:t>=</a:t>
+            </a:r>
+            <a:r>
+              <a:rPr sz="1800" lang="en"/>
+              <a:t> </a:t>
+            </a:r>
+            <a:r>
+              <a:rPr sz="1800" lang="en">
+                <a:solidFill>
+                  <a:srgbClr val="E34ADC"/>
+                </a:solidFill>
+              </a:rPr>
+              <a:t>str</a:t>
+            </a:r>
+            <a:r>
+              <a:rPr sz="1800" lang="en">
+                <a:solidFill>
+                  <a:srgbClr val="808030"/>
+                </a:solidFill>
+              </a:rPr>
+              <a:t>(</a:t>
+            </a:r>
+            <a:r>
+              <a:rPr sz="1800" lang="en"/>
+              <a:t>client</a:t>
+            </a:r>
+            <a:r>
+              <a:rPr sz="1800" lang="en">
+                <a:solidFill>
+                  <a:srgbClr val="808030"/>
+                </a:solidFill>
+              </a:rPr>
+              <a:t>.</a:t>
+            </a:r>
+            <a:r>
+              <a:rPr sz="1800" lang="en"/>
+              <a:t>read</a:t>
+            </a:r>
+            <a:r>
+              <a:rPr sz="1800" lang="en">
+                <a:solidFill>
+                  <a:srgbClr val="808030"/>
+                </a:solidFill>
+              </a:rPr>
+              <a:t>(</a:t>
+            </a:r>
+            <a:r>
+              <a:rPr sz="1800" lang="en">
+                <a:solidFill>
+                  <a:srgbClr val="0000E6"/>
+                </a:solidFill>
+              </a:rPr>
+              <a:t>'/app/services/redis'</a:t>
+            </a:r>
+            <a:r>
+              <a:rPr sz="1800" lang="en">
+                <a:solidFill>
+                  <a:srgbClr val="808030"/>
+                </a:solidFill>
+              </a:rPr>
+              <a:t>).</a:t>
+            </a:r>
+            <a:r>
+              <a:rPr sz="1800" lang="en"/>
+              <a:t>_children</a:t>
+            </a:r>
+            <a:r>
+              <a:rPr sz="1800" lang="en">
+                <a:solidFill>
+                  <a:srgbClr val="808030"/>
+                </a:solidFill>
+              </a:rPr>
+              <a:t>[</a:t>
+            </a:r>
+            <a:r>
+              <a:rPr sz="1800" lang="en">
+                <a:solidFill>
+                  <a:srgbClr val="008C00"/>
+                </a:solidFill>
+              </a:rPr>
+              <a:t>0</a:t>
+            </a:r>
+            <a:r>
+              <a:rPr sz="1800" lang="en">
+                <a:solidFill>
+                  <a:srgbClr val="808030"/>
+                </a:solidFill>
+              </a:rPr>
+              <a:t>][</a:t>
+            </a:r>
+            <a:r>
+              <a:rPr sz="1800" lang="en">
+                <a:solidFill>
+                  <a:srgbClr val="0000E6"/>
+                </a:solidFill>
+              </a:rPr>
+              <a:t>'value'</a:t>
+            </a:r>
+            <a:r>
+              <a:rPr sz="1800" lang="en">
+                <a:solidFill>
+                  <a:srgbClr val="808030"/>
+                </a:solidFill>
+              </a:rPr>
+              <a:t>])</a:t>
+            </a:r>
+            <a:br>
+              <a:rPr sz="1800" lang="en"/>
+            </a:br>
+            <a:r>
+              <a:rPr sz="1800" lang="en"/>
+              <a:t>       redis_url </a:t>
+            </a:r>
+            <a:r>
+              <a:rPr sz="1800" lang="en">
+                <a:solidFill>
+                  <a:srgbClr val="808030"/>
+                </a:solidFill>
+              </a:rPr>
+              <a:t>=</a:t>
+            </a:r>
+            <a:r>
+              <a:rPr sz="1800" lang="en"/>
+              <a:t> </a:t>
+            </a:r>
+            <a:r>
+              <a:rPr sz="1800" lang="en">
+                <a:solidFill>
+                  <a:srgbClr val="0000E6"/>
+                </a:solidFill>
+              </a:rPr>
+              <a:t>'redis://{0}/0'</a:t>
+            </a:r>
+            <a:r>
+              <a:rPr sz="1800" lang="en">
+                <a:solidFill>
+                  <a:srgbClr val="808030"/>
+                </a:solidFill>
+              </a:rPr>
+              <a:t>.</a:t>
+            </a:r>
+            <a:r>
+              <a:rPr sz="1800" lang="en"/>
+              <a:t>format</a:t>
+            </a:r>
+            <a:r>
+              <a:rPr sz="1800" lang="en">
+                <a:solidFill>
+                  <a:srgbClr val="808030"/>
+                </a:solidFill>
+              </a:rPr>
+              <a:t>(</a:t>
+            </a:r>
+            <a:r>
+              <a:rPr sz="1800" lang="en"/>
+              <a:t>key</a:t>
+            </a:r>
+            <a:r>
+              <a:rPr sz="1800" lang="en">
+                <a:solidFill>
+                  <a:srgbClr val="808030"/>
+                </a:solidFill>
+              </a:rPr>
+              <a:t>)</a:t>
+            </a:r>
+            <a:br>
+              <a:rPr sz="1800" lang="en"/>
+            </a:br>
+            <a:r>
+              <a:rPr sz="1800" lang="en"/>
+              <a:t>       count </a:t>
+            </a:r>
+            <a:r>
+              <a:rPr sz="1800" lang="en">
+                <a:solidFill>
+                  <a:srgbClr val="808030"/>
+                </a:solidFill>
+              </a:rPr>
+              <a:t>=</a:t>
+            </a:r>
+            <a:r>
+              <a:rPr sz="1800" lang="en"/>
+              <a:t> redis</a:t>
+            </a:r>
+            <a:r>
+              <a:rPr sz="1800" lang="en">
+                <a:solidFill>
+                  <a:srgbClr val="808030"/>
+                </a:solidFill>
+              </a:rPr>
+              <a:t>.</a:t>
+            </a:r>
+            <a:r>
+              <a:rPr sz="1800" lang="en"/>
+              <a:t>StrictRedis</a:t>
+            </a:r>
+            <a:r>
+              <a:rPr sz="1800" lang="en">
+                <a:solidFill>
+                  <a:srgbClr val="808030"/>
+                </a:solidFill>
+              </a:rPr>
+              <a:t>.</a:t>
+            </a:r>
+            <a:r>
+              <a:rPr sz="1800" lang="en"/>
+              <a:t>from_url</a:t>
+            </a:r>
+            <a:r>
+              <a:rPr sz="1800" lang="en">
+                <a:solidFill>
+                  <a:srgbClr val="808030"/>
+                </a:solidFill>
+              </a:rPr>
+              <a:t>(</a:t>
+            </a:r>
+            <a:r>
+              <a:rPr sz="1800" lang="en"/>
+              <a:t>redis_url</a:t>
+            </a:r>
+            <a:r>
+              <a:rPr sz="1800" lang="en">
+                <a:solidFill>
+                  <a:srgbClr val="808030"/>
+                </a:solidFill>
+              </a:rPr>
+              <a:t>).</a:t>
+            </a:r>
+            <a:r>
+              <a:rPr sz="1800" lang="en"/>
+              <a:t>incr</a:t>
+            </a:r>
+            <a:r>
+              <a:rPr sz="1800" lang="en">
+                <a:solidFill>
+                  <a:srgbClr val="808030"/>
+                </a:solidFill>
+              </a:rPr>
+              <a:t>(</a:t>
+            </a:r>
+            <a:r>
+              <a:rPr sz="1800" lang="en">
+                <a:solidFill>
+                  <a:srgbClr val="0000E6"/>
+                </a:solidFill>
+              </a:rPr>
+              <a:t>"counter"</a:t>
+            </a:r>
+            <a:r>
+              <a:rPr sz="1800" lang="en">
+                <a:solidFill>
+                  <a:srgbClr val="808030"/>
+                </a:solidFill>
+              </a:rPr>
+              <a:t>)</a:t>
             </a:r>
           </a:p>
         </p:txBody>
@@ -7763,7 +8056,7 @@
             </a:pPr>
             <a:r>
               <a:rPr lang="en"/>
-              <a:t>Other tools</a:t>
+              <a:t>Health checks and monitoring</a:t>
             </a:r>
           </a:p>
         </p:txBody>
@@ -7791,6 +8084,18 @@
           </a:bodyPr>
           <a:lstStyle/>
           <a:p>
+            <a:pPr rtl="0">
+              <a:spcBef>
+                <a:spcPts val="0"/>
+              </a:spcBef>
+              <a:buNone/>
+            </a:pPr>
+            <a:r>
+              <a:rPr lang="en"/>
+              <a:t>Active</a:t>
+            </a:r>
+          </a:p>
+          <a:p>
             <a:pPr rtl="0" lvl="0" indent="-419100" marL="457200">
               <a:spcBef>
                 <a:spcPts val="0"/>
@@ -7803,17 +8108,24 @@
               <a:buChar char="●"/>
             </a:pPr>
             <a:r>
-              <a:rPr u="sng" lang="en">
-                <a:solidFill>
-                  <a:schemeClr val="hlink"/>
-                </a:solidFill>
-                <a:hlinkClick r:id="rId3"/>
-              </a:rPr>
-              <a:t>https://github.com/jwilder/docker-gen</a:t>
-            </a:r>
-          </a:p>
-          <a:p>
-            <a:pPr rtl="0" lvl="0" indent="-419100" marL="457200">
+              <a:rPr lang="en"/>
+              <a:t>Consul health checks</a:t>
+            </a:r>
+          </a:p>
+          <a:p>
+            <a:pPr rtl="0">
+              <a:spcBef>
+                <a:spcPts val="0"/>
+              </a:spcBef>
+              <a:buNone/>
+            </a:pPr>
+            <a:r>
+              <a:rPr lang="en"/>
+              <a:t>Passive</a:t>
+            </a:r>
+          </a:p>
+          <a:p>
+            <a:pPr lvl="0" indent="-419100" marL="457200">
               <a:spcBef>
                 <a:spcPts val="0"/>
               </a:spcBef>
@@ -7825,35 +8137,8 @@
               <a:buChar char="●"/>
             </a:pPr>
             <a:r>
-              <a:rPr u="sng" lang="en">
-                <a:solidFill>
-                  <a:schemeClr val="hlink"/>
-                </a:solidFill>
-                <a:hlinkClick r:id="rId4"/>
-              </a:rPr>
-              <a:t>https://github.com/airbnb/synapse</a:t>
-            </a:r>
-          </a:p>
-          <a:p>
-            <a:pPr lvl="0" indent="-419100" marL="457200">
-              <a:spcBef>
-                <a:spcPts val="0"/>
-              </a:spcBef>
-              <a:buClr>
-                <a:schemeClr val="dk1"/>
-              </a:buClr>
-              <a:buSzPct val="100000"/>
-              <a:buFont typeface="Arial"/>
-              <a:buChar char="●"/>
-            </a:pPr>
-            <a:r>
-              <a:rPr u="sng" lang="en">
-                <a:solidFill>
-                  <a:schemeClr val="hlink"/>
-                </a:solidFill>
-                <a:hlinkClick r:id="rId5"/>
-              </a:rPr>
-              <a:t>https://github.com/skynetservices/skydns</a:t>
+              <a:rPr lang="en"/>
+              <a:t>Heartbeats with TTLs</a:t>
             </a:r>
           </a:p>
         </p:txBody>

</xml_diff>